<commit_message>
worked on code samples
</commit_message>
<xml_diff>
--- a/angular presentation.pptx
+++ b/angular presentation.pptx
@@ -5,7 +5,7 @@
     <p:sldMasterId id="2147483660" r:id="rId1"/>
   </p:sldMasterIdLst>
   <p:notesMasterIdLst>
-    <p:notesMasterId r:id="rId14"/>
+    <p:notesMasterId r:id="rId15"/>
   </p:notesMasterIdLst>
   <p:sldIdLst>
     <p:sldId id="256" r:id="rId2"/>
@@ -20,6 +20,7 @@
     <p:sldId id="267" r:id="rId11"/>
     <p:sldId id="263" r:id="rId12"/>
     <p:sldId id="265" r:id="rId13"/>
+    <p:sldId id="268" r:id="rId14"/>
   </p:sldIdLst>
   <p:sldSz cx="9144000" cy="6858000" type="screen4x3"/>
   <p:notesSz cx="6858000" cy="9144000"/>
@@ -203,7 +204,7 @@
           <a:p>
             <a:fld id="{38155B89-8BA9-4A47-884D-CA827C23995D}" type="datetimeFigureOut">
               <a:rPr lang="en-US" smtClean="0"/>
-              <a:t>11/6/14</a:t>
+              <a:t>11/20/14</a:t>
             </a:fld>
             <a:endParaRPr lang="en-US"/>
           </a:p>
@@ -743,7 +744,7 @@
             <a:fld id="{2FE7D661-1836-44F7-8FAF-35E8F866ECD3}" type="datetime1">
               <a:rPr lang="en-US" smtClean="0"/>
               <a:pPr/>
-              <a:t>11/6/14</a:t>
+              <a:t>11/20/14</a:t>
             </a:fld>
             <a:endParaRPr lang="en-US"/>
           </a:p>
@@ -909,7 +910,7 @@
           <a:p>
             <a:fld id="{B1FF71CE-B899-4B2B-848D-9F12F0C901B6}" type="datetimeFigureOut">
               <a:rPr lang="en-US" smtClean="0"/>
-              <a:t>11/6/14</a:t>
+              <a:t>11/20/14</a:t>
             </a:fld>
             <a:endParaRPr lang="en-US"/>
           </a:p>
@@ -1085,7 +1086,7 @@
             <a:fld id="{102CF1CA-F464-4B29-B867-EAF8A9B936E3}" type="datetime1">
               <a:rPr lang="en-US" smtClean="0"/>
               <a:pPr/>
-              <a:t>11/6/14</a:t>
+              <a:t>11/20/14</a:t>
             </a:fld>
             <a:endParaRPr lang="en-US" dirty="0"/>
           </a:p>
@@ -1252,7 +1253,7 @@
             <a:fld id="{CAE6B357-51B9-47D2-A71D-0D06CB03185D}" type="datetime1">
               <a:rPr lang="en-US" smtClean="0"/>
               <a:pPr/>
-              <a:t>11/6/14</a:t>
+              <a:t>11/20/14</a:t>
             </a:fld>
             <a:endParaRPr lang="en-US"/>
           </a:p>
@@ -1493,7 +1494,7 @@
             <a:fld id="{058CB827-F132-4DF6-9FB9-4035A4C798EF}" type="datetime1">
               <a:rPr lang="en-US" smtClean="0"/>
               <a:pPr/>
-              <a:t>11/6/14</a:t>
+              <a:t>11/20/14</a:t>
             </a:fld>
             <a:endParaRPr lang="en-US"/>
           </a:p>
@@ -1585,7 +1586,7 @@
             <a:fld id="{1A92A601-7D32-4ED7-AD1A-974B6DDBDCDC}" type="datetime1">
               <a:rPr lang="en-US" smtClean="0"/>
               <a:pPr/>
-              <a:t>11/6/14</a:t>
+              <a:t>11/20/14</a:t>
             </a:fld>
             <a:endParaRPr lang="en-US"/>
           </a:p>
@@ -1961,7 +1962,7 @@
             <a:fld id="{63A17B41-4A0C-4639-A132-E5C8F99A4BE8}" type="datetime1">
               <a:rPr lang="en-US" smtClean="0"/>
               <a:pPr/>
-              <a:t>11/6/14</a:t>
+              <a:t>11/20/14</a:t>
             </a:fld>
             <a:endParaRPr lang="en-US"/>
           </a:p>
@@ -2218,7 +2219,7 @@
             <a:fld id="{BE9967FD-6084-4075-993E-77EC8038773F}" type="datetime1">
               <a:rPr lang="en-US" smtClean="0"/>
               <a:pPr/>
-              <a:t>11/6/14</a:t>
+              <a:t>11/20/14</a:t>
             </a:fld>
             <a:endParaRPr lang="en-US"/>
           </a:p>
@@ -2310,7 +2311,7 @@
             <a:fld id="{3B988B47-74BA-4873-ADAE-EB0120124E83}" type="datetime1">
               <a:rPr lang="en-US" smtClean="0"/>
               <a:pPr/>
-              <a:t>11/6/14</a:t>
+              <a:t>11/20/14</a:t>
             </a:fld>
             <a:endParaRPr lang="en-US"/>
           </a:p>
@@ -2586,7 +2587,7 @@
             <a:fld id="{93CF52C1-9A39-494C-9977-BBEFAB872C1F}" type="datetime1">
               <a:rPr lang="en-US" smtClean="0"/>
               <a:pPr/>
-              <a:t>11/6/14</a:t>
+              <a:t>11/20/14</a:t>
             </a:fld>
             <a:endParaRPr lang="en-US"/>
           </a:p>
@@ -2860,7 +2861,7 @@
             <a:fld id="{CD1EACE2-EA00-4376-9A66-47ABB8B02CF5}" type="datetime1">
               <a:rPr lang="en-US" smtClean="0"/>
               <a:pPr/>
-              <a:t>11/6/14</a:t>
+              <a:t>11/20/14</a:t>
             </a:fld>
             <a:endParaRPr lang="en-US"/>
           </a:p>
@@ -3162,7 +3163,7 @@
             <a:fld id="{DA47DADC-55EA-4839-91C8-5BCC0EC06F5C}" type="datetime1">
               <a:rPr lang="en-US" smtClean="0"/>
               <a:pPr/>
-              <a:t>11/6/14</a:t>
+              <a:t>11/20/14</a:t>
             </a:fld>
             <a:endParaRPr lang="en-US" dirty="0"/>
           </a:p>
@@ -4020,6 +4021,173 @@
 </p:sld>
 </file>
 
+<file path=ppt/slides/slide13.xml><?xml version="1.0" encoding="utf-8"?>
+<p:sld xmlns:a="http://schemas.openxmlformats.org/drawingml/2006/main" xmlns:r="http://schemas.openxmlformats.org/officeDocument/2006/relationships" xmlns:p="http://schemas.openxmlformats.org/presentationml/2006/main">
+  <p:cSld>
+    <p:spTree>
+      <p:nvGrpSpPr>
+        <p:cNvPr id="1" name=""/>
+        <p:cNvGrpSpPr/>
+        <p:nvPr/>
+      </p:nvGrpSpPr>
+      <p:grpSpPr>
+        <a:xfrm>
+          <a:off x="0" y="0"/>
+          <a:ext cx="0" cy="0"/>
+          <a:chOff x="0" y="0"/>
+          <a:chExt cx="0" cy="0"/>
+        </a:xfrm>
+      </p:grpSpPr>
+      <p:sp>
+        <p:nvSpPr>
+          <p:cNvPr id="2" name="Title 1"/>
+          <p:cNvSpPr>
+            <a:spLocks noGrp="1"/>
+          </p:cNvSpPr>
+          <p:nvPr>
+            <p:ph type="title"/>
+          </p:nvPr>
+        </p:nvSpPr>
+        <p:spPr/>
+        <p:txBody>
+          <a:bodyPr/>
+          <a:lstStyle/>
+          <a:p>
+            <a:r>
+              <a:rPr lang="en-US" dirty="0" smtClean="0"/>
+              <a:t>Links for Your Enjoyment</a:t>
+            </a:r>
+            <a:endParaRPr lang="en-US" dirty="0"/>
+          </a:p>
+        </p:txBody>
+      </p:sp>
+      <p:sp>
+        <p:nvSpPr>
+          <p:cNvPr id="3" name="Content Placeholder 2"/>
+          <p:cNvSpPr>
+            <a:spLocks noGrp="1"/>
+          </p:cNvSpPr>
+          <p:nvPr>
+            <p:ph idx="1"/>
+          </p:nvPr>
+        </p:nvSpPr>
+        <p:spPr/>
+        <p:txBody>
+          <a:bodyPr/>
+          <a:lstStyle/>
+          <a:p>
+            <a:r>
+              <a:rPr lang="hu-HU" dirty="0">
+                <a:hlinkClick r:id="rId2"/>
+              </a:rPr>
+              <a:t>https://docs.angularjs.org</a:t>
+            </a:r>
+            <a:r>
+              <a:rPr lang="hu-HU" dirty="0" smtClean="0">
+                <a:hlinkClick r:id="rId2"/>
+              </a:rPr>
+              <a:t>/</a:t>
+            </a:r>
+            <a:endParaRPr lang="hu-HU" dirty="0" smtClean="0"/>
+          </a:p>
+          <a:p>
+            <a:pPr lvl="1"/>
+            <a:r>
+              <a:rPr lang="hu-HU" dirty="0"/>
+              <a:t>Specifically: 	</a:t>
+            </a:r>
+            <a:r>
+              <a:rPr lang="hu-HU" dirty="0">
+                <a:hlinkClick r:id="rId3"/>
+              </a:rPr>
+              <a:t>https://docs.angularjs.org/</a:t>
+            </a:r>
+            <a:r>
+              <a:rPr lang="hu-HU" dirty="0" smtClean="0">
+                <a:hlinkClick r:id="rId3"/>
+              </a:rPr>
+              <a:t>tutorial</a:t>
+            </a:r>
+            <a:endParaRPr lang="hu-HU" dirty="0" smtClean="0"/>
+          </a:p>
+          <a:p>
+            <a:r>
+              <a:rPr lang="pl-PL" dirty="0">
+                <a:hlinkClick r:id="rId4"/>
+              </a:rPr>
+              <a:t>http://yeoman.io</a:t>
+            </a:r>
+            <a:r>
+              <a:rPr lang="pl-PL" dirty="0" smtClean="0">
+                <a:hlinkClick r:id="rId4"/>
+              </a:rPr>
+              <a:t>/</a:t>
+            </a:r>
+            <a:endParaRPr lang="pl-PL" dirty="0"/>
+          </a:p>
+          <a:p>
+            <a:r>
+              <a:rPr lang="hu-HU" dirty="0">
+                <a:hlinkClick r:id="rId5"/>
+              </a:rPr>
+              <a:t>http://gruntjs.com</a:t>
+            </a:r>
+            <a:r>
+              <a:rPr lang="hu-HU" dirty="0" smtClean="0">
+                <a:hlinkClick r:id="rId5"/>
+              </a:rPr>
+              <a:t>/</a:t>
+            </a:r>
+            <a:endParaRPr lang="hu-HU" dirty="0" smtClean="0"/>
+          </a:p>
+          <a:p>
+            <a:r>
+              <a:rPr lang="pl-PL" dirty="0"/>
+              <a:t>http://</a:t>
+            </a:r>
+            <a:r>
+              <a:rPr lang="pl-PL" dirty="0" err="1"/>
+              <a:t>bower.io</a:t>
+            </a:r>
+            <a:r>
+              <a:rPr lang="pl-PL"/>
+              <a:t>/</a:t>
+            </a:r>
+            <a:endParaRPr lang="hu-HU" dirty="0" smtClean="0"/>
+          </a:p>
+          <a:p>
+            <a:r>
+              <a:rPr lang="en-US" dirty="0">
+                <a:hlinkClick r:id="rId6"/>
+              </a:rPr>
+              <a:t>http://stackoverflow.com/questions/tagged/</a:t>
+            </a:r>
+            <a:r>
+              <a:rPr lang="en-US" dirty="0" smtClean="0">
+                <a:hlinkClick r:id="rId6"/>
+              </a:rPr>
+              <a:t>angularjs</a:t>
+            </a:r>
+            <a:endParaRPr lang="en-US" dirty="0" smtClean="0"/>
+          </a:p>
+          <a:p>
+            <a:endParaRPr lang="hu-HU" dirty="0" smtClean="0"/>
+          </a:p>
+        </p:txBody>
+      </p:sp>
+    </p:spTree>
+    <p:extLst>
+      <p:ext uri="{BB962C8B-B14F-4D97-AF65-F5344CB8AC3E}">
+        <p14:creationId xmlns:p14="http://schemas.microsoft.com/office/powerpoint/2010/main" val="1219734843"/>
+      </p:ext>
+    </p:extLst>
+  </p:cSld>
+  <p:clrMapOvr>
+    <a:masterClrMapping/>
+  </p:clrMapOvr>
+</p:sld>
+</file>
+
 <file path=ppt/slides/slide2.xml><?xml version="1.0" encoding="utf-8"?>
 <p:sld xmlns:a="http://schemas.openxmlformats.org/drawingml/2006/main" xmlns:r="http://schemas.openxmlformats.org/officeDocument/2006/relationships" xmlns:p="http://schemas.openxmlformats.org/presentationml/2006/main">
   <p:cSld>
@@ -4705,7 +4873,6 @@
               <a:rPr lang="en-US" dirty="0" smtClean="0"/>
               <a:t>Data-binding is an automatic way of updating the view whenever the model changes, as well as updating the model whenever the view changes.  </a:t>
             </a:r>
-            <a:endParaRPr lang="en-US" dirty="0" smtClean="0"/>
           </a:p>
           <a:p>
             <a:r>
@@ -4725,13 +4892,8 @@
           <a:p>
             <a:r>
               <a:rPr lang="en-US" dirty="0" smtClean="0"/>
-              <a:t>Code it</a:t>
-            </a:r>
-            <a:r>
-              <a:rPr lang="en-US" dirty="0" smtClean="0"/>
-              <a:t>! – sample1.html</a:t>
-            </a:r>
-            <a:endParaRPr lang="en-US" dirty="0" smtClean="0"/>
+              <a:t>Code it! – sample1.html</a:t>
+            </a:r>
           </a:p>
         </p:txBody>
       </p:sp>

</xml_diff>

<commit_message>
added a slide about team collaboration
</commit_message>
<xml_diff>
--- a/angular presentation.pptx
+++ b/angular presentation.pptx
@@ -5,22 +5,24 @@
     <p:sldMasterId id="2147483660" r:id="rId1"/>
   </p:sldMasterIdLst>
   <p:notesMasterIdLst>
-    <p:notesMasterId r:id="rId15"/>
+    <p:notesMasterId r:id="rId17"/>
   </p:notesMasterIdLst>
   <p:sldIdLst>
     <p:sldId id="256" r:id="rId2"/>
     <p:sldId id="257" r:id="rId3"/>
     <p:sldId id="259" r:id="rId4"/>
     <p:sldId id="260" r:id="rId5"/>
-    <p:sldId id="264" r:id="rId6"/>
-    <p:sldId id="262" r:id="rId7"/>
-    <p:sldId id="258" r:id="rId8"/>
-    <p:sldId id="261" r:id="rId9"/>
-    <p:sldId id="266" r:id="rId10"/>
-    <p:sldId id="267" r:id="rId11"/>
-    <p:sldId id="263" r:id="rId12"/>
-    <p:sldId id="265" r:id="rId13"/>
-    <p:sldId id="268" r:id="rId14"/>
+    <p:sldId id="270" r:id="rId6"/>
+    <p:sldId id="264" r:id="rId7"/>
+    <p:sldId id="262" r:id="rId8"/>
+    <p:sldId id="258" r:id="rId9"/>
+    <p:sldId id="261" r:id="rId10"/>
+    <p:sldId id="266" r:id="rId11"/>
+    <p:sldId id="267" r:id="rId12"/>
+    <p:sldId id="263" r:id="rId13"/>
+    <p:sldId id="269" r:id="rId14"/>
+    <p:sldId id="265" r:id="rId15"/>
+    <p:sldId id="268" r:id="rId16"/>
   </p:sldIdLst>
   <p:sldSz cx="9144000" cy="6858000" type="screen4x3"/>
   <p:notesSz cx="6858000" cy="9144000"/>
@@ -537,7 +539,7 @@
           <a:p>
             <a:fld id="{BD115506-9773-F744-8E03-E23CD6659B62}" type="slidenum">
               <a:rPr lang="en-US" smtClean="0"/>
-              <a:t>7</a:t>
+              <a:t>8</a:t>
             </a:fld>
             <a:endParaRPr lang="en-US"/>
           </a:p>
@@ -3707,13 +3709,13 @@
         <p:spPr/>
         <p:txBody>
           <a:bodyPr>
-            <a:normAutofit/>
+            <a:normAutofit fontScale="90000"/>
           </a:bodyPr>
           <a:lstStyle/>
           <a:p>
             <a:r>
               <a:rPr lang="en-US" dirty="0" smtClean="0"/>
-              <a:t>Factories and Services</a:t>
+              <a:t>A Note on Dependency Injection</a:t>
             </a:r>
             <a:endParaRPr lang="en-US" dirty="0"/>
           </a:p>
@@ -3731,78 +3733,115 @@
         </p:nvSpPr>
         <p:spPr/>
         <p:txBody>
-          <a:bodyPr>
-            <a:normAutofit lnSpcReduction="10000"/>
-          </a:bodyPr>
-          <a:lstStyle/>
-          <a:p>
-            <a:r>
-              <a:rPr lang="en-US" dirty="0" smtClean="0"/>
-              <a:t>Used to share code across your app</a:t>
-            </a:r>
-          </a:p>
-          <a:p>
-            <a:r>
-              <a:rPr lang="en-US" dirty="0" smtClean="0"/>
-              <a:t>Dependency injection</a:t>
-            </a:r>
-          </a:p>
-          <a:p>
-            <a:r>
-              <a:rPr lang="en-US" dirty="0" smtClean="0"/>
-              <a:t>Singletons</a:t>
-            </a:r>
-          </a:p>
-          <a:p>
-            <a:r>
-              <a:rPr lang="en-US" dirty="0" smtClean="0"/>
-              <a:t>Can represent a </a:t>
-            </a:r>
+          <a:bodyPr/>
+          <a:lstStyle/>
+          <a:p>
             <a:r>
               <a:rPr lang="en-US" dirty="0" err="1" smtClean="0"/>
-              <a:t>RESTful</a:t>
-            </a:r>
-            <a:r>
-              <a:rPr lang="en-US" dirty="0" smtClean="0"/>
-              <a:t> client</a:t>
-            </a:r>
-          </a:p>
-          <a:p>
-            <a:r>
-              <a:rPr lang="en-US" dirty="0" smtClean="0"/>
-              <a:t>Factory = Object or function that is already built, use in your code</a:t>
-            </a:r>
-          </a:p>
-          <a:p>
-            <a:r>
-              <a:rPr lang="en-US" dirty="0" smtClean="0"/>
-              <a:t>Service= Object that needs some customization. </a:t>
-            </a:r>
-          </a:p>
-          <a:p>
-            <a:r>
-              <a:rPr lang="en-US" dirty="0" smtClean="0"/>
-              <a:t>Interchangeable for the most part. Use factory when in doubt.</a:t>
+              <a:t>Angular’s</a:t>
+            </a:r>
+            <a:r>
+              <a:rPr lang="en-US" dirty="0" smtClean="0"/>
+              <a:t> way of “injecting” objects into your controllers, factories, etc.</a:t>
+            </a:r>
+          </a:p>
+          <a:p>
+            <a:r>
+              <a:rPr lang="en-US" dirty="0" smtClean="0"/>
+              <a:t>Very powerful, </a:t>
+            </a:r>
+            <a:r>
+              <a:rPr lang="en-US" dirty="0" err="1" smtClean="0"/>
+              <a:t>kinda</a:t>
+            </a:r>
+            <a:r>
+              <a:rPr lang="en-US" dirty="0" smtClean="0"/>
+              <a:t> complicated, makes your life easier!</a:t>
+            </a:r>
+          </a:p>
+          <a:p>
+            <a:pPr lvl="1"/>
+            <a:r>
+              <a:rPr lang="en-US" dirty="0" smtClean="0"/>
+              <a:t>.controller(“</a:t>
+            </a:r>
+            <a:r>
+              <a:rPr lang="en-US" dirty="0" err="1" smtClean="0"/>
+              <a:t>AppService</a:t>
+            </a:r>
+            <a:r>
+              <a:rPr lang="en-US" dirty="0" smtClean="0"/>
+              <a:t>”,function(</a:t>
+            </a:r>
+            <a:r>
+              <a:rPr lang="en-US" dirty="0" err="1" smtClean="0"/>
+              <a:t>myAppService</a:t>
+            </a:r>
+            <a:r>
+              <a:rPr lang="en-US" dirty="0" smtClean="0"/>
+              <a:t>){ … });</a:t>
+            </a:r>
+          </a:p>
+          <a:p>
+            <a:pPr lvl="1"/>
+            <a:r>
+              <a:rPr lang="en-US" dirty="0" smtClean="0"/>
+              <a:t>.factory(“</a:t>
+            </a:r>
+            <a:r>
+              <a:rPr lang="en-US" dirty="0" err="1" smtClean="0"/>
+              <a:t>AnotherFactory</a:t>
+            </a:r>
+            <a:r>
+              <a:rPr lang="en-US" dirty="0" smtClean="0"/>
+              <a:t>”,function(</a:t>
+            </a:r>
+            <a:r>
+              <a:rPr lang="en-US" dirty="0" err="1" smtClean="0"/>
+              <a:t>otherFactory</a:t>
+            </a:r>
+            <a:r>
+              <a:rPr lang="en-US" dirty="0" smtClean="0"/>
+              <a:t>){ …});</a:t>
+            </a:r>
+          </a:p>
+          <a:p>
+            <a:pPr lvl="1"/>
+            <a:r>
+              <a:rPr lang="en-US" dirty="0" smtClean="0"/>
+              <a:t>.service(function($</a:t>
+            </a:r>
+            <a:r>
+              <a:rPr lang="en-US" dirty="0" err="1" smtClean="0"/>
+              <a:t>scope,$http</a:t>
+            </a:r>
+            <a:r>
+              <a:rPr lang="en-US" dirty="0" smtClean="0"/>
+              <a:t>){ … }) </a:t>
+            </a:r>
+          </a:p>
+          <a:p>
+            <a:pPr marL="320040" lvl="1" indent="0">
+              <a:buNone/>
+            </a:pPr>
+            <a:r>
+              <a:rPr lang="en-US" dirty="0"/>
+              <a:t>	</a:t>
+            </a:r>
+            <a:r>
+              <a:rPr lang="en-US" dirty="0" smtClean="0"/>
+              <a:t>					</a:t>
             </a:r>
           </a:p>
           <a:p>
             <a:endParaRPr lang="en-US" dirty="0"/>
-          </a:p>
-          <a:p>
-            <a:r>
-              <a:rPr lang="en-US" dirty="0" smtClean="0"/>
-              <a:t>Code it! (sample2-with-factory.html)</a:t>
-            </a:r>
-          </a:p>
-          <a:p>
-            <a:endParaRPr lang="en-US" dirty="0" smtClean="0"/>
           </a:p>
         </p:txBody>
       </p:sp>
     </p:spTree>
     <p:extLst>
       <p:ext uri="{BB962C8B-B14F-4D97-AF65-F5344CB8AC3E}">
-        <p14:creationId xmlns:p14="http://schemas.microsoft.com/office/powerpoint/2010/main" val="1720601796"/>
+        <p14:creationId xmlns:p14="http://schemas.microsoft.com/office/powerpoint/2010/main" val="2214402365"/>
       </p:ext>
     </p:extLst>
   </p:cSld>
@@ -3841,12 +3880,14 @@
         </p:nvSpPr>
         <p:spPr/>
         <p:txBody>
-          <a:bodyPr/>
-          <a:lstStyle/>
-          <a:p>
-            <a:r>
-              <a:rPr lang="en-US" dirty="0" smtClean="0"/>
-              <a:t>Bring it Together with Routes</a:t>
+          <a:bodyPr>
+            <a:normAutofit/>
+          </a:bodyPr>
+          <a:lstStyle/>
+          <a:p>
+            <a:r>
+              <a:rPr lang="en-US" dirty="0" smtClean="0"/>
+              <a:t>Factories and Services</a:t>
             </a:r>
             <a:endParaRPr lang="en-US" dirty="0"/>
           </a:p>
@@ -3864,82 +3905,78 @@
         </p:nvSpPr>
         <p:spPr/>
         <p:txBody>
-          <a:bodyPr/>
-          <a:lstStyle/>
-          <a:p>
-            <a:r>
-              <a:rPr lang="en-US" dirty="0" smtClean="0"/>
-              <a:t>Routes allow for deep linking into your single page apps.</a:t>
-            </a:r>
-          </a:p>
-          <a:p>
-            <a:r>
-              <a:rPr lang="en-US" dirty="0" smtClean="0"/>
-              <a:t>Or more simply, they’re links to pages.</a:t>
-            </a:r>
-          </a:p>
-          <a:p>
-            <a:r>
-              <a:rPr lang="en-US" dirty="0" smtClean="0"/>
-              <a:t>Use partials (html files) and </a:t>
+          <a:bodyPr>
+            <a:normAutofit lnSpcReduction="10000"/>
+          </a:bodyPr>
+          <a:lstStyle/>
+          <a:p>
+            <a:r>
+              <a:rPr lang="en-US" dirty="0" smtClean="0"/>
+              <a:t>Used to share code across your app</a:t>
+            </a:r>
+          </a:p>
+          <a:p>
+            <a:r>
+              <a:rPr lang="en-US" dirty="0" smtClean="0"/>
+              <a:t>Dependency injection</a:t>
+            </a:r>
+          </a:p>
+          <a:p>
+            <a:r>
+              <a:rPr lang="en-US" dirty="0" smtClean="0"/>
+              <a:t>Singletons</a:t>
+            </a:r>
+          </a:p>
+          <a:p>
+            <a:r>
+              <a:rPr lang="en-US" dirty="0" smtClean="0"/>
+              <a:t>Can represent a </a:t>
             </a:r>
             <a:r>
               <a:rPr lang="en-US" dirty="0" err="1" smtClean="0"/>
-              <a:t>ng</a:t>
-            </a:r>
-            <a:r>
-              <a:rPr lang="en-US" dirty="0" smtClean="0"/>
-              <a:t>-view (directive) to show routes</a:t>
-            </a:r>
-          </a:p>
-          <a:p>
-            <a:r>
-              <a:rPr lang="en-US" dirty="0" smtClean="0"/>
-              <a:t>Don’t forget to include </a:t>
-            </a:r>
-            <a:r>
-              <a:rPr lang="en-US" dirty="0" err="1" smtClean="0"/>
-              <a:t>ngroute.js</a:t>
-            </a:r>
-            <a:r>
-              <a:rPr lang="en-US" dirty="0"/>
-              <a:t> </a:t>
-            </a:r>
-            <a:r>
-              <a:rPr lang="en-US" dirty="0" smtClean="0"/>
-              <a:t>and inject it as a dependency (More on dependency injection coming up)</a:t>
-            </a:r>
-          </a:p>
-          <a:p>
-            <a:r>
-              <a:rPr lang="en-US" dirty="0" smtClean="0"/>
-              <a:t>Also, routes require a web server to serve files (CORS)</a:t>
+              <a:t>RESTful</a:t>
+            </a:r>
+            <a:r>
+              <a:rPr lang="en-US" dirty="0" smtClean="0"/>
+              <a:t> client</a:t>
+            </a:r>
+          </a:p>
+          <a:p>
+            <a:r>
+              <a:rPr lang="en-US" dirty="0" smtClean="0"/>
+              <a:t>Factory = Object or function that is already built, use in your code</a:t>
+            </a:r>
+          </a:p>
+          <a:p>
+            <a:r>
+              <a:rPr lang="en-US" dirty="0" smtClean="0"/>
+              <a:t>Service= Object that needs some customization. </a:t>
+            </a:r>
+          </a:p>
+          <a:p>
+            <a:r>
+              <a:rPr lang="en-US" dirty="0" smtClean="0"/>
+              <a:t>Interchangeable for the most part. Use factory when in doubt.</a:t>
+            </a:r>
+          </a:p>
+          <a:p>
+            <a:endParaRPr lang="en-US" dirty="0"/>
+          </a:p>
+          <a:p>
+            <a:r>
+              <a:rPr lang="en-US" dirty="0" smtClean="0"/>
+              <a:t>Code it! (sample2-with-factory.html)</a:t>
             </a:r>
           </a:p>
           <a:p>
             <a:endParaRPr lang="en-US" dirty="0" smtClean="0"/>
-          </a:p>
-          <a:p>
-            <a:r>
-              <a:rPr lang="en-US" dirty="0" smtClean="0"/>
-              <a:t>Code It! (Add to sample2.html to integrate notes with </a:t>
-            </a:r>
-            <a:r>
-              <a:rPr lang="en-US" dirty="0" err="1" smtClean="0"/>
-              <a:t>todo</a:t>
-            </a:r>
-            <a:r>
-              <a:rPr lang="en-US" dirty="0" smtClean="0"/>
-              <a:t>)</a:t>
-            </a:r>
-            <a:endParaRPr lang="en-US" dirty="0"/>
           </a:p>
         </p:txBody>
       </p:sp>
     </p:spTree>
     <p:extLst>
       <p:ext uri="{BB962C8B-B14F-4D97-AF65-F5344CB8AC3E}">
-        <p14:creationId xmlns:p14="http://schemas.microsoft.com/office/powerpoint/2010/main" val="416360939"/>
+        <p14:creationId xmlns:p14="http://schemas.microsoft.com/office/powerpoint/2010/main" val="1720601796"/>
       </p:ext>
     </p:extLst>
   </p:cSld>
@@ -3983,7 +4020,7 @@
           <a:p>
             <a:r>
               <a:rPr lang="en-US" dirty="0" smtClean="0"/>
-              <a:t>Unit Testing</a:t>
+              <a:t>Bring it Together with Routes</a:t>
             </a:r>
             <a:endParaRPr lang="en-US" dirty="0"/>
           </a:p>
@@ -4004,14 +4041,89 @@
           <a:bodyPr/>
           <a:lstStyle/>
           <a:p>
-            <a:endParaRPr lang="en-US"/>
+            <a:r>
+              <a:rPr lang="en-US" dirty="0" smtClean="0"/>
+              <a:t>Routes allow for deep linking into your single page apps.</a:t>
+            </a:r>
+          </a:p>
+          <a:p>
+            <a:r>
+              <a:rPr lang="en-US" dirty="0" smtClean="0"/>
+              <a:t>Or more simply, they’re links to pages.</a:t>
+            </a:r>
+          </a:p>
+          <a:p>
+            <a:r>
+              <a:rPr lang="en-US" dirty="0" smtClean="0"/>
+              <a:t>Use partials (html files) and </a:t>
+            </a:r>
+            <a:r>
+              <a:rPr lang="en-US" dirty="0" err="1" smtClean="0"/>
+              <a:t>ng</a:t>
+            </a:r>
+            <a:r>
+              <a:rPr lang="en-US" dirty="0" smtClean="0"/>
+              <a:t>-view (directive) to show routes</a:t>
+            </a:r>
+          </a:p>
+          <a:p>
+            <a:r>
+              <a:rPr lang="en-US" dirty="0" smtClean="0"/>
+              <a:t>Don’t forget to include </a:t>
+            </a:r>
+            <a:r>
+              <a:rPr lang="en-US" dirty="0" err="1" smtClean="0"/>
+              <a:t>ngroute.js</a:t>
+            </a:r>
+            <a:r>
+              <a:rPr lang="en-US" dirty="0"/>
+              <a:t> </a:t>
+            </a:r>
+            <a:r>
+              <a:rPr lang="en-US" dirty="0" smtClean="0"/>
+              <a:t>and inject it as a dependency </a:t>
+            </a:r>
+            <a:endParaRPr lang="en-US" dirty="0" smtClean="0"/>
+          </a:p>
+          <a:p>
+            <a:r>
+              <a:rPr lang="en-US" dirty="0" smtClean="0"/>
+              <a:t>Also</a:t>
+            </a:r>
+            <a:r>
+              <a:rPr lang="en-US" dirty="0" smtClean="0"/>
+              <a:t>, routes require a web server to serve files (CORS</a:t>
+            </a:r>
+            <a:r>
+              <a:rPr lang="en-US" dirty="0" smtClean="0"/>
+              <a:t>), don’t try to run locally</a:t>
+            </a:r>
+            <a:endParaRPr lang="en-US" dirty="0" smtClean="0"/>
+          </a:p>
+          <a:p>
+            <a:endParaRPr lang="en-US" dirty="0" smtClean="0"/>
+          </a:p>
+          <a:p>
+            <a:r>
+              <a:rPr lang="en-US" dirty="0" smtClean="0"/>
+              <a:t>Code It! (Add to sample2.html to integrate notes with </a:t>
+            </a:r>
+            <a:r>
+              <a:rPr lang="en-US" dirty="0" err="1" smtClean="0"/>
+              <a:t>todo</a:t>
+            </a:r>
+            <a:r>
+              <a:rPr lang="en-US" dirty="0" smtClean="0"/>
+              <a:t>)</a:t>
+            </a:r>
+            <a:endParaRPr lang="en-US" dirty="0"/>
           </a:p>
         </p:txBody>
       </p:sp>
     </p:spTree>
     <p:extLst>
       <p:ext uri="{BB962C8B-B14F-4D97-AF65-F5344CB8AC3E}">
-        <p14:creationId xmlns:p14="http://schemas.microsoft.com/office/powerpoint/2010/main" val="1829710934"/>
+        <p14:creationId xmlns:p14="http://schemas.microsoft.com/office/powerpoint/2010/main" val="416360939"/>
       </p:ext>
     </p:extLst>
   </p:cSld>
@@ -4055,6 +4167,264 @@
           <a:p>
             <a:r>
               <a:rPr lang="en-US" dirty="0" smtClean="0"/>
+              <a:t>Scaffolding</a:t>
+            </a:r>
+            <a:endParaRPr lang="en-US" dirty="0"/>
+          </a:p>
+        </p:txBody>
+      </p:sp>
+      <p:sp>
+        <p:nvSpPr>
+          <p:cNvPr id="3" name="Content Placeholder 2"/>
+          <p:cNvSpPr>
+            <a:spLocks noGrp="1"/>
+          </p:cNvSpPr>
+          <p:nvPr>
+            <p:ph idx="1"/>
+          </p:nvPr>
+        </p:nvSpPr>
+        <p:spPr/>
+        <p:txBody>
+          <a:bodyPr/>
+          <a:lstStyle/>
+          <a:p>
+            <a:r>
+              <a:rPr lang="en-US" dirty="0" err="1" smtClean="0"/>
+              <a:t>Yoeman</a:t>
+            </a:r>
+            <a:endParaRPr lang="en-US" dirty="0" smtClean="0"/>
+          </a:p>
+          <a:p>
+            <a:pPr lvl="1"/>
+            <a:r>
+              <a:rPr lang="en-US" dirty="0" err="1" smtClean="0"/>
+              <a:t>NodeJS</a:t>
+            </a:r>
+            <a:endParaRPr lang="en-US" dirty="0" smtClean="0"/>
+          </a:p>
+          <a:p>
+            <a:pPr lvl="1"/>
+            <a:r>
+              <a:rPr lang="en-US" dirty="0" smtClean="0"/>
+              <a:t>Grunt</a:t>
+            </a:r>
+          </a:p>
+          <a:p>
+            <a:pPr lvl="1"/>
+            <a:r>
+              <a:rPr lang="en-US" dirty="0" smtClean="0"/>
+              <a:t>Bower</a:t>
+            </a:r>
+          </a:p>
+          <a:p>
+            <a:r>
+              <a:rPr lang="en-US" dirty="0" err="1" smtClean="0"/>
+              <a:t>NodeJS</a:t>
+            </a:r>
+            <a:r>
+              <a:rPr lang="en-US" dirty="0" smtClean="0"/>
+              <a:t> is required </a:t>
+            </a:r>
+          </a:p>
+          <a:p>
+            <a:endParaRPr lang="en-US" dirty="0"/>
+          </a:p>
+          <a:p>
+            <a:r>
+              <a:rPr lang="en-US" dirty="0" smtClean="0"/>
+              <a:t>Code it!</a:t>
+            </a:r>
+            <a:endParaRPr lang="en-US" dirty="0"/>
+          </a:p>
+          <a:p>
+            <a:pPr marL="320040" lvl="1" indent="0">
+              <a:buNone/>
+            </a:pPr>
+            <a:r>
+              <a:rPr lang="en-US" dirty="0"/>
+              <a:t>	</a:t>
+            </a:r>
+            <a:endParaRPr lang="en-US" dirty="0" smtClean="0"/>
+          </a:p>
+        </p:txBody>
+      </p:sp>
+    </p:spTree>
+    <p:extLst>
+      <p:ext uri="{BB962C8B-B14F-4D97-AF65-F5344CB8AC3E}">
+        <p14:creationId xmlns:p14="http://schemas.microsoft.com/office/powerpoint/2010/main" val="650019994"/>
+      </p:ext>
+    </p:extLst>
+  </p:cSld>
+  <p:clrMapOvr>
+    <a:masterClrMapping/>
+  </p:clrMapOvr>
+</p:sld>
+</file>
+
+<file path=ppt/slides/slide14.xml><?xml version="1.0" encoding="utf-8"?>
+<p:sld xmlns:a="http://schemas.openxmlformats.org/drawingml/2006/main" xmlns:r="http://schemas.openxmlformats.org/officeDocument/2006/relationships" xmlns:p="http://schemas.openxmlformats.org/presentationml/2006/main">
+  <p:cSld>
+    <p:spTree>
+      <p:nvGrpSpPr>
+        <p:cNvPr id="1" name=""/>
+        <p:cNvGrpSpPr/>
+        <p:nvPr/>
+      </p:nvGrpSpPr>
+      <p:grpSpPr>
+        <a:xfrm>
+          <a:off x="0" y="0"/>
+          <a:ext cx="0" cy="0"/>
+          <a:chOff x="0" y="0"/>
+          <a:chExt cx="0" cy="0"/>
+        </a:xfrm>
+      </p:grpSpPr>
+      <p:sp>
+        <p:nvSpPr>
+          <p:cNvPr id="2" name="Title 1"/>
+          <p:cNvSpPr>
+            <a:spLocks noGrp="1"/>
+          </p:cNvSpPr>
+          <p:nvPr>
+            <p:ph type="title"/>
+          </p:nvPr>
+        </p:nvSpPr>
+        <p:spPr/>
+        <p:txBody>
+          <a:bodyPr/>
+          <a:lstStyle/>
+          <a:p>
+            <a:r>
+              <a:rPr lang="en-US" dirty="0" smtClean="0"/>
+              <a:t>Unit Testing</a:t>
+            </a:r>
+            <a:endParaRPr lang="en-US" dirty="0"/>
+          </a:p>
+        </p:txBody>
+      </p:sp>
+      <p:sp>
+        <p:nvSpPr>
+          <p:cNvPr id="3" name="Content Placeholder 2"/>
+          <p:cNvSpPr>
+            <a:spLocks noGrp="1"/>
+          </p:cNvSpPr>
+          <p:nvPr>
+            <p:ph idx="1"/>
+          </p:nvPr>
+        </p:nvSpPr>
+        <p:spPr/>
+        <p:txBody>
+          <a:bodyPr/>
+          <a:lstStyle/>
+          <a:p>
+            <a:r>
+              <a:rPr lang="en-US" dirty="0" smtClean="0"/>
+              <a:t>Karma</a:t>
+            </a:r>
+          </a:p>
+          <a:p>
+            <a:pPr lvl="1"/>
+            <a:r>
+              <a:rPr lang="en-US" dirty="0" smtClean="0"/>
+              <a:t>Built by same team as Angular (</a:t>
+            </a:r>
+            <a:r>
+              <a:rPr lang="en-US" dirty="0" err="1" smtClean="0"/>
+              <a:t>google</a:t>
+            </a:r>
+            <a:r>
+              <a:rPr lang="en-US" dirty="0" smtClean="0"/>
+              <a:t> guys, should be good right?)</a:t>
+            </a:r>
+          </a:p>
+          <a:p>
+            <a:pPr lvl="1"/>
+            <a:r>
+              <a:rPr lang="en-US" dirty="0" smtClean="0"/>
+              <a:t>Node </a:t>
+            </a:r>
+            <a:r>
+              <a:rPr lang="en-US" dirty="0" err="1" smtClean="0"/>
+              <a:t>js</a:t>
+            </a:r>
+            <a:r>
+              <a:rPr lang="en-US" dirty="0" smtClean="0"/>
+              <a:t>, install with </a:t>
+            </a:r>
+            <a:r>
+              <a:rPr lang="en-US" dirty="0" err="1" smtClean="0"/>
+              <a:t>npm</a:t>
+            </a:r>
+            <a:endParaRPr lang="en-US" dirty="0" smtClean="0"/>
+          </a:p>
+          <a:p>
+            <a:pPr lvl="1"/>
+            <a:r>
+              <a:rPr lang="en-US" dirty="0" smtClean="0"/>
+              <a:t>Install locally per project. </a:t>
+            </a:r>
+            <a:r>
+              <a:rPr lang="en-US" dirty="0" smtClean="0"/>
+              <a:t>Modifies </a:t>
+            </a:r>
+            <a:r>
+              <a:rPr lang="en-US" dirty="0" err="1" smtClean="0"/>
+              <a:t>package.json</a:t>
+            </a:r>
+            <a:endParaRPr lang="en-US" dirty="0" smtClean="0"/>
+          </a:p>
+          <a:p>
+            <a:pPr lvl="1"/>
+            <a:endParaRPr lang="en-US" dirty="0"/>
+          </a:p>
+        </p:txBody>
+      </p:sp>
+    </p:spTree>
+    <p:extLst>
+      <p:ext uri="{BB962C8B-B14F-4D97-AF65-F5344CB8AC3E}">
+        <p14:creationId xmlns:p14="http://schemas.microsoft.com/office/powerpoint/2010/main" val="1829710934"/>
+      </p:ext>
+    </p:extLst>
+  </p:cSld>
+  <p:clrMapOvr>
+    <a:masterClrMapping/>
+  </p:clrMapOvr>
+</p:sld>
+</file>
+
+<file path=ppt/slides/slide15.xml><?xml version="1.0" encoding="utf-8"?>
+<p:sld xmlns:a="http://schemas.openxmlformats.org/drawingml/2006/main" xmlns:r="http://schemas.openxmlformats.org/officeDocument/2006/relationships" xmlns:p="http://schemas.openxmlformats.org/presentationml/2006/main">
+  <p:cSld>
+    <p:spTree>
+      <p:nvGrpSpPr>
+        <p:cNvPr id="1" name=""/>
+        <p:cNvGrpSpPr/>
+        <p:nvPr/>
+      </p:nvGrpSpPr>
+      <p:grpSpPr>
+        <a:xfrm>
+          <a:off x="0" y="0"/>
+          <a:ext cx="0" cy="0"/>
+          <a:chOff x="0" y="0"/>
+          <a:chExt cx="0" cy="0"/>
+        </a:xfrm>
+      </p:grpSpPr>
+      <p:sp>
+        <p:nvSpPr>
+          <p:cNvPr id="2" name="Title 1"/>
+          <p:cNvSpPr>
+            <a:spLocks noGrp="1"/>
+          </p:cNvSpPr>
+          <p:nvPr>
+            <p:ph type="title"/>
+          </p:nvPr>
+        </p:nvSpPr>
+        <p:spPr/>
+        <p:txBody>
+          <a:bodyPr/>
+          <a:lstStyle/>
+          <a:p>
+            <a:r>
+              <a:rPr lang="en-US" dirty="0" smtClean="0"/>
               <a:t>Links for Your Enjoyment</a:t>
             </a:r>
             <a:endParaRPr lang="en-US" dirty="0"/>
@@ -4142,29 +4512,29 @@
           </a:p>
           <a:p>
             <a:r>
-              <a:rPr lang="pl-PL" dirty="0"/>
-              <a:t>http://</a:t>
-            </a:r>
-            <a:r>
-              <a:rPr lang="pl-PL" dirty="0" err="1"/>
-              <a:t>bower.io</a:t>
-            </a:r>
-            <a:r>
-              <a:rPr lang="pl-PL"/>
-              <a:t>/</a:t>
-            </a:r>
-            <a:endParaRPr lang="hu-HU" dirty="0" smtClean="0"/>
-          </a:p>
-          <a:p>
-            <a:r>
-              <a:rPr lang="en-US" dirty="0">
+              <a:rPr lang="pl-PL" dirty="0">
                 <a:hlinkClick r:id="rId6"/>
               </a:rPr>
+              <a:t>http://bower.io</a:t>
+            </a:r>
+            <a:r>
+              <a:rPr lang="pl-PL" dirty="0" smtClean="0">
+                <a:hlinkClick r:id="rId6"/>
+              </a:rPr>
+              <a:t>/</a:t>
+            </a:r>
+            <a:endParaRPr lang="hu-HU" dirty="0" smtClean="0"/>
+          </a:p>
+          <a:p>
+            <a:r>
+              <a:rPr lang="en-US" dirty="0">
+                <a:hlinkClick r:id="rId7"/>
+              </a:rPr>
               <a:t>http://stackoverflow.com/questions/tagged/</a:t>
             </a:r>
             <a:r>
               <a:rPr lang="en-US" dirty="0" smtClean="0">
-                <a:hlinkClick r:id="rId6"/>
+                <a:hlinkClick r:id="rId7"/>
               </a:rPr>
               <a:t>angularjs</a:t>
             </a:r>
@@ -4523,7 +4893,18 @@
             <a:pPr lvl="2"/>
             <a:r>
               <a:rPr lang="en-US" sz="2000" dirty="0" smtClean="0"/>
-              <a:t>Single page applications</a:t>
+              <a:t>Single page </a:t>
+            </a:r>
+            <a:r>
+              <a:rPr lang="en-US" sz="2000" dirty="0" smtClean="0"/>
+              <a:t>applications</a:t>
+            </a:r>
+          </a:p>
+          <a:p>
+            <a:pPr lvl="2"/>
+            <a:r>
+              <a:rPr lang="en-US" sz="2000" dirty="0" smtClean="0"/>
+              <a:t>Team collaboration</a:t>
             </a:r>
             <a:endParaRPr lang="en-US" sz="2000" dirty="0"/>
           </a:p>
@@ -4576,7 +4957,11 @@
           <a:p>
             <a:r>
               <a:rPr lang="en-US" dirty="0" smtClean="0"/>
-              <a:t>A Note on SPA</a:t>
+              <a:t>A note on Team </a:t>
+            </a:r>
+            <a:r>
+              <a:rPr lang="en-US" dirty="0" err="1" smtClean="0"/>
+              <a:t>Collab</a:t>
             </a:r>
             <a:endParaRPr lang="en-US" dirty="0"/>
           </a:p>
@@ -4599,47 +4984,24 @@
           <a:p>
             <a:r>
               <a:rPr lang="en-US" dirty="0" smtClean="0"/>
-              <a:t>SPA = Single Page Applications</a:t>
-            </a:r>
-          </a:p>
-          <a:p>
-            <a:r>
-              <a:rPr lang="en-US" dirty="0" smtClean="0"/>
-              <a:t>Load time and server load is greatly reduced</a:t>
-            </a:r>
-          </a:p>
-          <a:p>
-            <a:r>
-              <a:rPr lang="en-US" dirty="0" err="1" smtClean="0"/>
-              <a:t>Rooms.ucmerced.edu</a:t>
-            </a:r>
+              <a:t>Using frameworks allows us to work more together, faster</a:t>
+            </a:r>
+          </a:p>
+          <a:p>
+            <a:r>
+              <a:rPr lang="en-US" dirty="0" smtClean="0"/>
+              <a:t>Using a consistent scaffolding will keep our code cleaner and more uniform</a:t>
+            </a:r>
+          </a:p>
+          <a:p>
+            <a:pPr lvl="1"/>
+            <a:r>
+              <a:rPr lang="en-US" dirty="0" smtClean="0"/>
+              <a:t>Yeoman (shown later)</a:t>
+            </a:r>
+          </a:p>
+          <a:p>
             <a:endParaRPr lang="en-US" dirty="0" smtClean="0"/>
-          </a:p>
-          <a:p>
-            <a:pPr lvl="1"/>
-            <a:r>
-              <a:rPr lang="en-US" dirty="0" smtClean="0"/>
-              <a:t>Header/footer/side bar are static “widgets” on every page</a:t>
-            </a:r>
-          </a:p>
-          <a:p>
-            <a:pPr lvl="1"/>
-            <a:r>
-              <a:rPr lang="en-US" dirty="0" smtClean="0"/>
-              <a:t>Show it</a:t>
-            </a:r>
-          </a:p>
-          <a:p>
-            <a:r>
-              <a:rPr lang="en-US" dirty="0" smtClean="0"/>
-              <a:t>Rooms application is fairly simple, what about a page with 100 widgets?</a:t>
-            </a:r>
-          </a:p>
-          <a:p>
-            <a:r>
-              <a:rPr lang="en-US" dirty="0" smtClean="0"/>
-              <a:t>Angular modules to the rescue</a:t>
-            </a:r>
           </a:p>
           <a:p>
             <a:endParaRPr lang="en-US" dirty="0"/>
@@ -4649,7 +5011,7 @@
     </p:spTree>
     <p:extLst>
       <p:ext uri="{BB962C8B-B14F-4D97-AF65-F5344CB8AC3E}">
-        <p14:creationId xmlns:p14="http://schemas.microsoft.com/office/powerpoint/2010/main" val="3790359322"/>
+        <p14:creationId xmlns:p14="http://schemas.microsoft.com/office/powerpoint/2010/main" val="290078575"/>
       </p:ext>
     </p:extLst>
   </p:cSld>
@@ -4693,7 +5055,7 @@
           <a:p>
             <a:r>
               <a:rPr lang="en-US" dirty="0" smtClean="0"/>
-              <a:t>Angular Html Elements</a:t>
+              <a:t>A Note on SPA</a:t>
             </a:r>
             <a:endParaRPr lang="en-US" dirty="0"/>
           </a:p>
@@ -4716,95 +5078,57 @@
           <a:p>
             <a:r>
               <a:rPr lang="en-US" dirty="0" smtClean="0"/>
-              <a:t>Angular HTML Elements let you add new functionality to HTML.</a:t>
-            </a:r>
-          </a:p>
-          <a:p>
-            <a:r>
-              <a:rPr lang="en-US" dirty="0" smtClean="0"/>
-              <a:t>Helps keep your views simple</a:t>
-            </a:r>
-          </a:p>
-          <a:p>
-            <a:r>
-              <a:rPr lang="en-US" dirty="0" smtClean="0"/>
-              <a:t>Simple way to tie into controllers</a:t>
-            </a:r>
-          </a:p>
-          <a:p>
-            <a:r>
-              <a:rPr lang="en-US" dirty="0" smtClean="0"/>
-              <a:t>Directives!</a:t>
+              <a:t>SPA = Single Page Applications</a:t>
+            </a:r>
+          </a:p>
+          <a:p>
+            <a:r>
+              <a:rPr lang="en-US" dirty="0" smtClean="0"/>
+              <a:t>Load time and server load is greatly reduced</a:t>
             </a:r>
           </a:p>
           <a:p>
             <a:r>
               <a:rPr lang="en-US" dirty="0" err="1" smtClean="0"/>
-              <a:t>ngApp</a:t>
-            </a:r>
-            <a:r>
-              <a:rPr lang="en-US" dirty="0" smtClean="0"/>
-              <a:t>, </a:t>
-            </a:r>
-            <a:r>
-              <a:rPr lang="en-US" dirty="0" err="1" smtClean="0"/>
-              <a:t>ngController</a:t>
-            </a:r>
-            <a:r>
-              <a:rPr lang="en-US" dirty="0" smtClean="0"/>
-              <a:t>, custom directives</a:t>
-            </a:r>
-          </a:p>
-          <a:p>
-            <a:r>
-              <a:rPr lang="en-US" dirty="0" smtClean="0"/>
-              <a:t>Examples</a:t>
-            </a:r>
+              <a:t>Rooms.ucmerced.edu</a:t>
+            </a:r>
+            <a:endParaRPr lang="en-US" dirty="0" smtClean="0"/>
           </a:p>
           <a:p>
             <a:pPr lvl="1"/>
             <a:r>
               <a:rPr lang="en-US" dirty="0" smtClean="0"/>
-              <a:t>&lt;div data-</a:t>
-            </a:r>
-            <a:r>
-              <a:rPr lang="en-US" dirty="0" err="1" smtClean="0"/>
-              <a:t>ng</a:t>
-            </a:r>
-            <a:r>
-              <a:rPr lang="en-US" dirty="0" smtClean="0"/>
-              <a:t>-controller=“homepage”&gt;</a:t>
+              <a:t>Header/footer/side bar are static “widgets” on every page</a:t>
             </a:r>
           </a:p>
           <a:p>
             <a:pPr lvl="1"/>
             <a:r>
               <a:rPr lang="en-US" dirty="0" smtClean="0"/>
-              <a:t>&lt;li </a:t>
-            </a:r>
-            <a:r>
-              <a:rPr lang="en-US" dirty="0" err="1" smtClean="0"/>
-              <a:t>ng</a:t>
-            </a:r>
-            <a:r>
-              <a:rPr lang="en-US" dirty="0" smtClean="0"/>
-              <a:t>-repeat=“</a:t>
-            </a:r>
-            <a:r>
-              <a:rPr lang="en-US" dirty="0" err="1" smtClean="0"/>
-              <a:t>myModel</a:t>
-            </a:r>
-            <a:r>
-              <a:rPr lang="en-US" dirty="0" smtClean="0"/>
-              <a:t>”&gt; …&lt;/li&gt;</a:t>
-            </a:r>
+              <a:t>Show it</a:t>
+            </a:r>
+          </a:p>
+          <a:p>
+            <a:r>
+              <a:rPr lang="en-US" dirty="0" smtClean="0"/>
+              <a:t>Rooms application is fairly simple, what about a page with 100 widgets?</a:t>
+            </a:r>
+          </a:p>
+          <a:p>
+            <a:r>
+              <a:rPr lang="en-US" dirty="0" smtClean="0"/>
+              <a:t>Angular modules to the rescue</a:t>
+            </a:r>
+          </a:p>
+          <a:p>
+            <a:endParaRPr lang="en-US" dirty="0"/>
           </a:p>
         </p:txBody>
       </p:sp>
     </p:spTree>
     <p:extLst>
       <p:ext uri="{BB962C8B-B14F-4D97-AF65-F5344CB8AC3E}">
-        <p14:creationId xmlns:p14="http://schemas.microsoft.com/office/powerpoint/2010/main" val="2969772706"/>
+        <p14:creationId xmlns:p14="http://schemas.microsoft.com/office/powerpoint/2010/main" val="3790359322"/>
       </p:ext>
     </p:extLst>
   </p:cSld>
@@ -4848,7 +5172,7 @@
           <a:p>
             <a:r>
               <a:rPr lang="en-US" dirty="0" smtClean="0"/>
-              <a:t>What is 2 Way Data Binding? </a:t>
+              <a:t>Angular Html Elements</a:t>
             </a:r>
             <a:endParaRPr lang="en-US" dirty="0"/>
           </a:p>
@@ -4871,28 +5195,87 @@
           <a:p>
             <a:r>
               <a:rPr lang="en-US" dirty="0" smtClean="0"/>
-              <a:t>Data-binding is an automatic way of updating the view whenever the model changes, as well as updating the model whenever the view changes.  </a:t>
-            </a:r>
-          </a:p>
-          <a:p>
-            <a:r>
-              <a:rPr lang="en-US" dirty="0" smtClean="0"/>
-              <a:t>The view is your html</a:t>
-            </a:r>
-          </a:p>
-          <a:p>
-            <a:pPr marL="45720" indent="0">
-              <a:buNone/>
-            </a:pPr>
-            <a:endParaRPr lang="en-US" dirty="0" smtClean="0"/>
-          </a:p>
-          <a:p>
-            <a:endParaRPr lang="en-US" dirty="0"/>
-          </a:p>
-          <a:p>
-            <a:r>
-              <a:rPr lang="en-US" dirty="0" smtClean="0"/>
-              <a:t>Code it! – sample1.html</a:t>
+              <a:t>Angular HTML Elements let you add new functionality to HTML.</a:t>
+            </a:r>
+          </a:p>
+          <a:p>
+            <a:r>
+              <a:rPr lang="en-US" dirty="0" smtClean="0"/>
+              <a:t>Helps keep your views simple</a:t>
+            </a:r>
+          </a:p>
+          <a:p>
+            <a:r>
+              <a:rPr lang="en-US" dirty="0" smtClean="0"/>
+              <a:t>Simple way to tie into controllers</a:t>
+            </a:r>
+          </a:p>
+          <a:p>
+            <a:r>
+              <a:rPr lang="en-US" dirty="0" smtClean="0"/>
+              <a:t>Directives!</a:t>
+            </a:r>
+          </a:p>
+          <a:p>
+            <a:r>
+              <a:rPr lang="en-US" dirty="0" err="1" smtClean="0"/>
+              <a:t>ngApp</a:t>
+            </a:r>
+            <a:r>
+              <a:rPr lang="en-US" dirty="0" smtClean="0"/>
+              <a:t>, </a:t>
+            </a:r>
+            <a:r>
+              <a:rPr lang="en-US" dirty="0" err="1" smtClean="0"/>
+              <a:t>ngController</a:t>
+            </a:r>
+            <a:r>
+              <a:rPr lang="en-US" dirty="0" smtClean="0"/>
+              <a:t>, custom directives</a:t>
+            </a:r>
+          </a:p>
+          <a:p>
+            <a:r>
+              <a:rPr lang="en-US" dirty="0" smtClean="0"/>
+              <a:t>Examples</a:t>
+            </a:r>
+          </a:p>
+          <a:p>
+            <a:pPr lvl="1"/>
+            <a:r>
+              <a:rPr lang="en-US" dirty="0" smtClean="0"/>
+              <a:t>&lt;div data-</a:t>
+            </a:r>
+            <a:r>
+              <a:rPr lang="en-US" dirty="0" err="1" smtClean="0"/>
+              <a:t>ng</a:t>
+            </a:r>
+            <a:r>
+              <a:rPr lang="en-US" dirty="0" smtClean="0"/>
+              <a:t>-controller=“homepage”&gt;</a:t>
+            </a:r>
+          </a:p>
+          <a:p>
+            <a:pPr lvl="1"/>
+            <a:r>
+              <a:rPr lang="en-US" dirty="0" smtClean="0"/>
+              <a:t>&lt;li </a:t>
+            </a:r>
+            <a:r>
+              <a:rPr lang="en-US" dirty="0" err="1" smtClean="0"/>
+              <a:t>ng</a:t>
+            </a:r>
+            <a:r>
+              <a:rPr lang="en-US" dirty="0" smtClean="0"/>
+              <a:t>-repeat=“</a:t>
+            </a:r>
+            <a:r>
+              <a:rPr lang="en-US" dirty="0" err="1" smtClean="0"/>
+              <a:t>myModel</a:t>
+            </a:r>
+            <a:r>
+              <a:rPr lang="en-US" dirty="0" smtClean="0"/>
+              <a:t>”&gt; …&lt;/li&gt;</a:t>
             </a:r>
           </a:p>
         </p:txBody>
@@ -4900,7 +5283,7 @@
     </p:spTree>
     <p:extLst>
       <p:ext uri="{BB962C8B-B14F-4D97-AF65-F5344CB8AC3E}">
-        <p14:creationId xmlns:p14="http://schemas.microsoft.com/office/powerpoint/2010/main" val="3799675944"/>
+        <p14:creationId xmlns:p14="http://schemas.microsoft.com/office/powerpoint/2010/main" val="2969772706"/>
       </p:ext>
     </p:extLst>
   </p:cSld>
@@ -4943,12 +5326,8 @@
           <a:lstStyle/>
           <a:p>
             <a:r>
-              <a:rPr lang="en-US" dirty="0" err="1" smtClean="0"/>
-              <a:t>Conrollers</a:t>
-            </a:r>
-            <a:r>
-              <a:rPr lang="en-US" dirty="0" smtClean="0"/>
-              <a:t> Explained</a:t>
+              <a:rPr lang="en-US" dirty="0" smtClean="0"/>
+              <a:t>What is 2 Way Data Binding? </a:t>
             </a:r>
             <a:endParaRPr lang="en-US" dirty="0"/>
           </a:p>
@@ -4971,38 +5350,20 @@
           <a:p>
             <a:r>
               <a:rPr lang="en-US" dirty="0" smtClean="0"/>
-              <a:t>The glue behind MVC – Links your view to your models</a:t>
-            </a:r>
-          </a:p>
-          <a:p>
-            <a:r>
-              <a:rPr lang="en-US" dirty="0" smtClean="0"/>
-              <a:t>Move DOM behavior out of the into a more readable place</a:t>
-            </a:r>
-          </a:p>
-          <a:p>
-            <a:r>
-              <a:rPr lang="en-US" dirty="0" smtClean="0"/>
-              <a:t>Link DOM and controllers to achieve 2 way data binding</a:t>
-            </a:r>
-          </a:p>
-          <a:p>
-            <a:r>
-              <a:rPr lang="en-US" dirty="0" smtClean="0"/>
-              <a:t>Use </a:t>
-            </a:r>
-            <a:r>
-              <a:rPr lang="en-US" dirty="0" err="1" smtClean="0"/>
-              <a:t>ngController</a:t>
-            </a:r>
-            <a:r>
-              <a:rPr lang="en-US" dirty="0"/>
-              <a:t> </a:t>
-            </a:r>
-            <a:r>
-              <a:rPr lang="en-US" dirty="0" smtClean="0"/>
-              <a:t>directive with $scope as the glue</a:t>
-            </a:r>
+              <a:t>Data-binding is an automatic way of updating the view whenever the model changes, as well as updating the model whenever the view changes.  </a:t>
+            </a:r>
+          </a:p>
+          <a:p>
+            <a:r>
+              <a:rPr lang="en-US" dirty="0" smtClean="0"/>
+              <a:t>The view is your html</a:t>
+            </a:r>
+          </a:p>
+          <a:p>
+            <a:pPr marL="45720" indent="0">
+              <a:buNone/>
+            </a:pPr>
+            <a:endParaRPr lang="en-US" dirty="0" smtClean="0"/>
           </a:p>
           <a:p>
             <a:endParaRPr lang="en-US" dirty="0"/>
@@ -5010,7 +5371,7 @@
           <a:p>
             <a:r>
               <a:rPr lang="en-US" dirty="0" smtClean="0"/>
-              <a:t>Code it! (sample2.html)</a:t>
+              <a:t>Code it! – sample1.html</a:t>
             </a:r>
           </a:p>
         </p:txBody>
@@ -5018,7 +5379,7 @@
     </p:spTree>
     <p:extLst>
       <p:ext uri="{BB962C8B-B14F-4D97-AF65-F5344CB8AC3E}">
-        <p14:creationId xmlns:p14="http://schemas.microsoft.com/office/powerpoint/2010/main" val="2835322995"/>
+        <p14:creationId xmlns:p14="http://schemas.microsoft.com/office/powerpoint/2010/main" val="3799675944"/>
       </p:ext>
     </p:extLst>
   </p:cSld>
@@ -5057,14 +5418,16 @@
         </p:nvSpPr>
         <p:spPr/>
         <p:txBody>
-          <a:bodyPr>
-            <a:normAutofit fontScale="90000"/>
-          </a:bodyPr>
-          <a:lstStyle/>
-          <a:p>
-            <a:r>
-              <a:rPr lang="en-US" dirty="0" smtClean="0"/>
-              <a:t>A Note on Dependency Injection</a:t>
+          <a:bodyPr/>
+          <a:lstStyle/>
+          <a:p>
+            <a:r>
+              <a:rPr lang="en-US" dirty="0" err="1" smtClean="0"/>
+              <a:t>Conrollers</a:t>
+            </a:r>
+            <a:r>
+              <a:rPr lang="en-US" dirty="0" smtClean="0"/>
+              <a:t> Explained</a:t>
             </a:r>
             <a:endParaRPr lang="en-US" dirty="0"/>
           </a:p>
@@ -5086,111 +5449,55 @@
           <a:lstStyle/>
           <a:p>
             <a:r>
+              <a:rPr lang="en-US" dirty="0" smtClean="0"/>
+              <a:t>The glue behind MVC – Links your view to your models</a:t>
+            </a:r>
+          </a:p>
+          <a:p>
+            <a:r>
+              <a:rPr lang="en-US" dirty="0" smtClean="0"/>
+              <a:t>Move DOM behavior out of the into a more readable place</a:t>
+            </a:r>
+          </a:p>
+          <a:p>
+            <a:r>
+              <a:rPr lang="en-US" dirty="0" smtClean="0"/>
+              <a:t>Link DOM and controllers to achieve 2 way data binding</a:t>
+            </a:r>
+          </a:p>
+          <a:p>
+            <a:r>
+              <a:rPr lang="en-US" dirty="0" smtClean="0"/>
+              <a:t>Use </a:t>
+            </a:r>
+            <a:r>
               <a:rPr lang="en-US" dirty="0" err="1" smtClean="0"/>
-              <a:t>Angular’s</a:t>
-            </a:r>
-            <a:r>
-              <a:rPr lang="en-US" dirty="0" smtClean="0"/>
-              <a:t> way of “injecting” objects into your controllers, factories, etc.</a:t>
-            </a:r>
-          </a:p>
-          <a:p>
-            <a:r>
-              <a:rPr lang="en-US" dirty="0" smtClean="0"/>
-              <a:t>Very powerful, </a:t>
-            </a:r>
-            <a:r>
-              <a:rPr lang="en-US" dirty="0" err="1" smtClean="0"/>
-              <a:t>kinda</a:t>
-            </a:r>
-            <a:r>
-              <a:rPr lang="en-US" dirty="0" smtClean="0"/>
-              <a:t> complicated, makes your life easier!</a:t>
-            </a:r>
-          </a:p>
-          <a:p>
-            <a:pPr lvl="1"/>
-            <a:r>
-              <a:rPr lang="en-US" dirty="0" smtClean="0"/>
-              <a:t>.controller(“</a:t>
-            </a:r>
-            <a:r>
-              <a:rPr lang="en-US" dirty="0" err="1" smtClean="0"/>
-              <a:t>AppService</a:t>
-            </a:r>
-            <a:r>
-              <a:rPr lang="en-US" dirty="0" smtClean="0"/>
-              <a:t>”,function(</a:t>
-            </a:r>
-            <a:r>
-              <a:rPr lang="en-US" dirty="0" err="1" smtClean="0"/>
-              <a:t>myAppService</a:t>
-            </a:r>
-            <a:r>
-              <a:rPr lang="en-US" dirty="0" smtClean="0"/>
-              <a:t>){ … });</a:t>
-            </a:r>
-          </a:p>
-          <a:p>
-            <a:pPr lvl="1"/>
-            <a:r>
-              <a:rPr lang="en-US" dirty="0" smtClean="0"/>
-              <a:t>.factory(“</a:t>
-            </a:r>
-            <a:r>
-              <a:rPr lang="en-US" dirty="0" err="1" smtClean="0"/>
-              <a:t>AnotherFactory</a:t>
-            </a:r>
-            <a:r>
-              <a:rPr lang="en-US" dirty="0" smtClean="0"/>
-              <a:t>”,function(</a:t>
-            </a:r>
-            <a:r>
-              <a:rPr lang="en-US" dirty="0" err="1" smtClean="0"/>
-              <a:t>otherFactory</a:t>
-            </a:r>
-            <a:r>
-              <a:rPr lang="en-US" dirty="0" smtClean="0"/>
-              <a:t>){ …});</a:t>
-            </a:r>
-          </a:p>
-          <a:p>
-            <a:pPr lvl="1"/>
-            <a:r>
-              <a:rPr lang="en-US" dirty="0" smtClean="0"/>
-              <a:t>.service(function($</a:t>
-            </a:r>
-            <a:r>
-              <a:rPr lang="en-US" dirty="0" err="1" smtClean="0"/>
-              <a:t>scope,$http</a:t>
-            </a:r>
-            <a:r>
-              <a:rPr lang="en-US" dirty="0" smtClean="0"/>
-              <a:t>){ … }) </a:t>
-            </a:r>
-          </a:p>
-          <a:p>
-            <a:pPr marL="320040" lvl="1" indent="0">
-              <a:buNone/>
-            </a:pPr>
+              <a:t>ngController</a:t>
+            </a:r>
             <a:r>
               <a:rPr lang="en-US" dirty="0"/>
-              <a:t>	</a:t>
-            </a:r>
-            <a:r>
-              <a:rPr lang="en-US" dirty="0" smtClean="0"/>
-              <a:t>					</a:t>
+              <a:t> </a:t>
+            </a:r>
+            <a:r>
+              <a:rPr lang="en-US" dirty="0" smtClean="0"/>
+              <a:t>directive with $scope as the glue</a:t>
             </a:r>
           </a:p>
           <a:p>
             <a:endParaRPr lang="en-US" dirty="0"/>
+          </a:p>
+          <a:p>
+            <a:r>
+              <a:rPr lang="en-US" dirty="0" smtClean="0"/>
+              <a:t>Code it! (sample2.html)</a:t>
+            </a:r>
           </a:p>
         </p:txBody>
       </p:sp>
     </p:spTree>
     <p:extLst>
       <p:ext uri="{BB962C8B-B14F-4D97-AF65-F5344CB8AC3E}">
-        <p14:creationId xmlns:p14="http://schemas.microsoft.com/office/powerpoint/2010/main" val="2214402365"/>
+        <p14:creationId xmlns:p14="http://schemas.microsoft.com/office/powerpoint/2010/main" val="2835322995"/>
       </p:ext>
     </p:extLst>
   </p:cSld>

</xml_diff>

<commit_message>
added slides to show how angular cleans up code
</commit_message>
<xml_diff>
--- a/angular presentation.pptx
+++ b/angular presentation.pptx
@@ -5,24 +5,27 @@
     <p:sldMasterId id="2147483660" r:id="rId1"/>
   </p:sldMasterIdLst>
   <p:notesMasterIdLst>
-    <p:notesMasterId r:id="rId17"/>
+    <p:notesMasterId r:id="rId20"/>
   </p:notesMasterIdLst>
   <p:sldIdLst>
     <p:sldId id="256" r:id="rId2"/>
     <p:sldId id="257" r:id="rId3"/>
     <p:sldId id="259" r:id="rId4"/>
     <p:sldId id="260" r:id="rId5"/>
-    <p:sldId id="270" r:id="rId6"/>
-    <p:sldId id="264" r:id="rId7"/>
-    <p:sldId id="262" r:id="rId8"/>
-    <p:sldId id="258" r:id="rId9"/>
-    <p:sldId id="261" r:id="rId10"/>
-    <p:sldId id="266" r:id="rId11"/>
-    <p:sldId id="267" r:id="rId12"/>
-    <p:sldId id="263" r:id="rId13"/>
-    <p:sldId id="269" r:id="rId14"/>
-    <p:sldId id="265" r:id="rId15"/>
-    <p:sldId id="268" r:id="rId16"/>
+    <p:sldId id="264" r:id="rId6"/>
+    <p:sldId id="270" r:id="rId7"/>
+    <p:sldId id="273" r:id="rId8"/>
+    <p:sldId id="271" r:id="rId9"/>
+    <p:sldId id="272" r:id="rId10"/>
+    <p:sldId id="262" r:id="rId11"/>
+    <p:sldId id="258" r:id="rId12"/>
+    <p:sldId id="261" r:id="rId13"/>
+    <p:sldId id="266" r:id="rId14"/>
+    <p:sldId id="267" r:id="rId15"/>
+    <p:sldId id="263" r:id="rId16"/>
+    <p:sldId id="269" r:id="rId17"/>
+    <p:sldId id="265" r:id="rId18"/>
+    <p:sldId id="268" r:id="rId19"/>
   </p:sldIdLst>
   <p:sldSz cx="9144000" cy="6858000" type="screen4x3"/>
   <p:notesSz cx="6858000" cy="9144000"/>
@@ -539,7 +542,7 @@
           <a:p>
             <a:fld id="{BD115506-9773-F744-8E03-E23CD6659B62}" type="slidenum">
               <a:rPr lang="en-US" smtClean="0"/>
-              <a:t>8</a:t>
+              <a:t>11</a:t>
             </a:fld>
             <a:endParaRPr lang="en-US"/>
           </a:p>
@@ -3708,14 +3711,12 @@
         </p:nvSpPr>
         <p:spPr/>
         <p:txBody>
-          <a:bodyPr>
-            <a:normAutofit fontScale="90000"/>
-          </a:bodyPr>
-          <a:lstStyle/>
-          <a:p>
-            <a:r>
-              <a:rPr lang="en-US" dirty="0" smtClean="0"/>
-              <a:t>A Note on Dependency Injection</a:t>
+          <a:bodyPr/>
+          <a:lstStyle/>
+          <a:p>
+            <a:r>
+              <a:rPr lang="en-US" dirty="0" smtClean="0"/>
+              <a:t>Angular Html Elements</a:t>
             </a:r>
             <a:endParaRPr lang="en-US" dirty="0"/>
           </a:p>
@@ -3737,111 +3738,96 @@
           <a:lstStyle/>
           <a:p>
             <a:r>
+              <a:rPr lang="en-US" dirty="0" smtClean="0"/>
+              <a:t>Angular HTML Elements let you add new functionality to HTML.</a:t>
+            </a:r>
+          </a:p>
+          <a:p>
+            <a:r>
+              <a:rPr lang="en-US" dirty="0" smtClean="0"/>
+              <a:t>Helps keep your views simple</a:t>
+            </a:r>
+          </a:p>
+          <a:p>
+            <a:r>
+              <a:rPr lang="en-US" dirty="0" smtClean="0"/>
+              <a:t>Simple way to tie into controllers</a:t>
+            </a:r>
+          </a:p>
+          <a:p>
+            <a:r>
+              <a:rPr lang="en-US" dirty="0" smtClean="0"/>
+              <a:t>Directives!</a:t>
+            </a:r>
+          </a:p>
+          <a:p>
+            <a:r>
               <a:rPr lang="en-US" dirty="0" err="1" smtClean="0"/>
-              <a:t>Angular’s</a:t>
-            </a:r>
-            <a:r>
-              <a:rPr lang="en-US" dirty="0" smtClean="0"/>
-              <a:t> way of “injecting” objects into your controllers, factories, etc.</a:t>
-            </a:r>
-          </a:p>
-          <a:p>
-            <a:r>
-              <a:rPr lang="en-US" dirty="0" smtClean="0"/>
-              <a:t>Very powerful, </a:t>
+              <a:t>ngApp</a:t>
+            </a:r>
+            <a:r>
+              <a:rPr lang="en-US" dirty="0" smtClean="0"/>
+              <a:t>, </a:t>
             </a:r>
             <a:r>
               <a:rPr lang="en-US" dirty="0" err="1" smtClean="0"/>
-              <a:t>kinda</a:t>
-            </a:r>
-            <a:r>
-              <a:rPr lang="en-US" dirty="0" smtClean="0"/>
-              <a:t> complicated, makes your life easier!</a:t>
+              <a:t>ngController</a:t>
+            </a:r>
+            <a:r>
+              <a:rPr lang="en-US" dirty="0" smtClean="0"/>
+              <a:t>, custom directives</a:t>
+            </a:r>
+          </a:p>
+          <a:p>
+            <a:r>
+              <a:rPr lang="en-US" dirty="0" smtClean="0"/>
+              <a:t>Examples</a:t>
             </a:r>
           </a:p>
           <a:p>
             <a:pPr lvl="1"/>
             <a:r>
               <a:rPr lang="en-US" dirty="0" smtClean="0"/>
-              <a:t>.controller(“</a:t>
+              <a:t>&lt;div data-</a:t>
             </a:r>
             <a:r>
               <a:rPr lang="en-US" dirty="0" err="1" smtClean="0"/>
-              <a:t>AppService</a:t>
-            </a:r>
-            <a:r>
-              <a:rPr lang="en-US" dirty="0" smtClean="0"/>
-              <a:t>”,function(</a:t>
+              <a:t>ng</a:t>
+            </a:r>
+            <a:r>
+              <a:rPr lang="en-US" dirty="0" smtClean="0"/>
+              <a:t>-controller=“homepage”&gt;</a:t>
+            </a:r>
+          </a:p>
+          <a:p>
+            <a:pPr lvl="1"/>
+            <a:r>
+              <a:rPr lang="en-US" dirty="0" smtClean="0"/>
+              <a:t>&lt;li </a:t>
             </a:r>
             <a:r>
               <a:rPr lang="en-US" dirty="0" err="1" smtClean="0"/>
-              <a:t>myAppService</a:t>
-            </a:r>
-            <a:r>
-              <a:rPr lang="en-US" dirty="0" smtClean="0"/>
-              <a:t>){ … });</a:t>
-            </a:r>
-          </a:p>
-          <a:p>
-            <a:pPr lvl="1"/>
-            <a:r>
-              <a:rPr lang="en-US" dirty="0" smtClean="0"/>
-              <a:t>.factory(“</a:t>
+              <a:t>ng</a:t>
+            </a:r>
+            <a:r>
+              <a:rPr lang="en-US" dirty="0" smtClean="0"/>
+              <a:t>-repeat=“</a:t>
             </a:r>
             <a:r>
               <a:rPr lang="en-US" dirty="0" err="1" smtClean="0"/>
-              <a:t>AnotherFactory</a:t>
-            </a:r>
-            <a:r>
-              <a:rPr lang="en-US" dirty="0" smtClean="0"/>
-              <a:t>”,function(</a:t>
-            </a:r>
-            <a:r>
-              <a:rPr lang="en-US" dirty="0" err="1" smtClean="0"/>
-              <a:t>otherFactory</a:t>
-            </a:r>
-            <a:r>
-              <a:rPr lang="en-US" dirty="0" smtClean="0"/>
-              <a:t>){ …});</a:t>
-            </a:r>
-          </a:p>
-          <a:p>
-            <a:pPr lvl="1"/>
-            <a:r>
-              <a:rPr lang="en-US" dirty="0" smtClean="0"/>
-              <a:t>.service(function($</a:t>
-            </a:r>
-            <a:r>
-              <a:rPr lang="en-US" dirty="0" err="1" smtClean="0"/>
-              <a:t>scope,$http</a:t>
-            </a:r>
-            <a:r>
-              <a:rPr lang="en-US" dirty="0" smtClean="0"/>
-              <a:t>){ … }) </a:t>
-            </a:r>
-          </a:p>
-          <a:p>
-            <a:pPr marL="320040" lvl="1" indent="0">
-              <a:buNone/>
-            </a:pPr>
-            <a:r>
-              <a:rPr lang="en-US" dirty="0"/>
-              <a:t>	</a:t>
-            </a:r>
-            <a:r>
-              <a:rPr lang="en-US" dirty="0" smtClean="0"/>
-              <a:t>					</a:t>
-            </a:r>
-          </a:p>
-          <a:p>
-            <a:endParaRPr lang="en-US" dirty="0"/>
+              <a:t>myModel</a:t>
+            </a:r>
+            <a:r>
+              <a:rPr lang="en-US" dirty="0" smtClean="0"/>
+              <a:t>”&gt; …&lt;/li&gt;</a:t>
+            </a:r>
           </a:p>
         </p:txBody>
       </p:sp>
     </p:spTree>
     <p:extLst>
       <p:ext uri="{BB962C8B-B14F-4D97-AF65-F5344CB8AC3E}">
-        <p14:creationId xmlns:p14="http://schemas.microsoft.com/office/powerpoint/2010/main" val="2214402365"/>
+        <p14:creationId xmlns:p14="http://schemas.microsoft.com/office/powerpoint/2010/main" val="2969772706"/>
       </p:ext>
     </p:extLst>
   </p:cSld>
@@ -3880,14 +3866,12 @@
         </p:nvSpPr>
         <p:spPr/>
         <p:txBody>
-          <a:bodyPr>
-            <a:normAutofit/>
-          </a:bodyPr>
-          <a:lstStyle/>
-          <a:p>
-            <a:r>
-              <a:rPr lang="en-US" dirty="0" smtClean="0"/>
-              <a:t>Factories and Services</a:t>
+          <a:bodyPr/>
+          <a:lstStyle/>
+          <a:p>
+            <a:r>
+              <a:rPr lang="en-US" dirty="0" smtClean="0"/>
+              <a:t>What is 2 Way Data Binding? </a:t>
             </a:r>
             <a:endParaRPr lang="en-US" dirty="0"/>
           </a:p>
@@ -3905,59 +3889,25 @@
         </p:nvSpPr>
         <p:spPr/>
         <p:txBody>
-          <a:bodyPr>
-            <a:normAutofit lnSpcReduction="10000"/>
-          </a:bodyPr>
-          <a:lstStyle/>
-          <a:p>
-            <a:r>
-              <a:rPr lang="en-US" dirty="0" smtClean="0"/>
-              <a:t>Used to share code across your app</a:t>
-            </a:r>
-          </a:p>
-          <a:p>
-            <a:r>
-              <a:rPr lang="en-US" dirty="0" smtClean="0"/>
-              <a:t>Dependency injection</a:t>
-            </a:r>
-          </a:p>
-          <a:p>
-            <a:r>
-              <a:rPr lang="en-US" dirty="0" smtClean="0"/>
-              <a:t>Singletons</a:t>
-            </a:r>
-          </a:p>
-          <a:p>
-            <a:r>
-              <a:rPr lang="en-US" dirty="0" smtClean="0"/>
-              <a:t>Can represent a </a:t>
-            </a:r>
-            <a:r>
-              <a:rPr lang="en-US" dirty="0" err="1" smtClean="0"/>
-              <a:t>RESTful</a:t>
-            </a:r>
-            <a:r>
-              <a:rPr lang="en-US" dirty="0" smtClean="0"/>
-              <a:t> client</a:t>
-            </a:r>
-          </a:p>
-          <a:p>
-            <a:r>
-              <a:rPr lang="en-US" dirty="0" smtClean="0"/>
-              <a:t>Factory = Object or function that is already built, use in your code</a:t>
-            </a:r>
-          </a:p>
-          <a:p>
-            <a:r>
-              <a:rPr lang="en-US" dirty="0" smtClean="0"/>
-              <a:t>Service= Object that needs some customization. </a:t>
-            </a:r>
-          </a:p>
-          <a:p>
-            <a:r>
-              <a:rPr lang="en-US" dirty="0" smtClean="0"/>
-              <a:t>Interchangeable for the most part. Use factory when in doubt.</a:t>
-            </a:r>
+          <a:bodyPr/>
+          <a:lstStyle/>
+          <a:p>
+            <a:r>
+              <a:rPr lang="en-US" dirty="0" smtClean="0"/>
+              <a:t>Data-binding is an automatic way of updating the view whenever the model changes, as well as updating the model whenever the view changes.  </a:t>
+            </a:r>
+          </a:p>
+          <a:p>
+            <a:r>
+              <a:rPr lang="en-US" dirty="0" smtClean="0"/>
+              <a:t>The view is your html</a:t>
+            </a:r>
+          </a:p>
+          <a:p>
+            <a:pPr marL="45720" indent="0">
+              <a:buNone/>
+            </a:pPr>
+            <a:endParaRPr lang="en-US" dirty="0" smtClean="0"/>
           </a:p>
           <a:p>
             <a:endParaRPr lang="en-US" dirty="0"/>
@@ -3965,18 +3915,15 @@
           <a:p>
             <a:r>
               <a:rPr lang="en-US" dirty="0" smtClean="0"/>
-              <a:t>Code it! (sample2-with-factory.html)</a:t>
-            </a:r>
-          </a:p>
-          <a:p>
-            <a:endParaRPr lang="en-US" dirty="0" smtClean="0"/>
+              <a:t>Code it! – sample1.html</a:t>
+            </a:r>
           </a:p>
         </p:txBody>
       </p:sp>
     </p:spTree>
     <p:extLst>
       <p:ext uri="{BB962C8B-B14F-4D97-AF65-F5344CB8AC3E}">
-        <p14:creationId xmlns:p14="http://schemas.microsoft.com/office/powerpoint/2010/main" val="1720601796"/>
+        <p14:creationId xmlns:p14="http://schemas.microsoft.com/office/powerpoint/2010/main" val="3799675944"/>
       </p:ext>
     </p:extLst>
   </p:cSld>
@@ -4019,8 +3966,12 @@
           <a:lstStyle/>
           <a:p>
             <a:r>
-              <a:rPr lang="en-US" dirty="0" smtClean="0"/>
-              <a:t>Bring it Together with Routes</a:t>
+              <a:rPr lang="en-US" dirty="0" err="1" smtClean="0"/>
+              <a:t>Conrollers</a:t>
+            </a:r>
+            <a:r>
+              <a:rPr lang="en-US" dirty="0" smtClean="0"/>
+              <a:t> Explained</a:t>
             </a:r>
             <a:endParaRPr lang="en-US" dirty="0"/>
           </a:p>
@@ -4043,37 +3994,29 @@
           <a:p>
             <a:r>
               <a:rPr lang="en-US" dirty="0" smtClean="0"/>
-              <a:t>Routes allow for deep linking into your single page apps.</a:t>
-            </a:r>
-          </a:p>
-          <a:p>
-            <a:r>
-              <a:rPr lang="en-US" dirty="0" smtClean="0"/>
-              <a:t>Or more simply, they’re links to pages.</a:t>
-            </a:r>
-          </a:p>
-          <a:p>
-            <a:r>
-              <a:rPr lang="en-US" dirty="0" smtClean="0"/>
-              <a:t>Use partials (html files) and </a:t>
+              <a:t>The glue behind MVC – Links your view to your models</a:t>
+            </a:r>
+          </a:p>
+          <a:p>
+            <a:r>
+              <a:rPr lang="en-US" dirty="0" smtClean="0"/>
+              <a:t>Move DOM behavior out of the into a more readable place</a:t>
+            </a:r>
+          </a:p>
+          <a:p>
+            <a:r>
+              <a:rPr lang="en-US" dirty="0" smtClean="0"/>
+              <a:t>Link DOM and controllers to achieve 2 way data binding</a:t>
+            </a:r>
+          </a:p>
+          <a:p>
+            <a:r>
+              <a:rPr lang="en-US" dirty="0" smtClean="0"/>
+              <a:t>Use </a:t>
             </a:r>
             <a:r>
               <a:rPr lang="en-US" dirty="0" err="1" smtClean="0"/>
-              <a:t>ng</a:t>
-            </a:r>
-            <a:r>
-              <a:rPr lang="en-US" dirty="0" smtClean="0"/>
-              <a:t>-view (directive) to show routes</a:t>
-            </a:r>
-          </a:p>
-          <a:p>
-            <a:r>
-              <a:rPr lang="en-US" dirty="0" smtClean="0"/>
-              <a:t>Don’t forget to include </a:t>
-            </a:r>
-            <a:r>
-              <a:rPr lang="en-US" dirty="0" err="1" smtClean="0"/>
-              <a:t>ngroute.js</a:t>
+              <a:t>ngController</a:t>
             </a:r>
             <a:r>
               <a:rPr lang="en-US" dirty="0"/>
@@ -4081,49 +4024,24 @@
             </a:r>
             <a:r>
               <a:rPr lang="en-US" dirty="0" smtClean="0"/>
-              <a:t>and inject it as a dependency </a:t>
-            </a:r>
-            <a:endParaRPr lang="en-US" dirty="0" smtClean="0"/>
-          </a:p>
-          <a:p>
-            <a:r>
-              <a:rPr lang="en-US" dirty="0" smtClean="0"/>
-              <a:t>Also</a:t>
-            </a:r>
-            <a:r>
-              <a:rPr lang="en-US" dirty="0" smtClean="0"/>
-              <a:t>, routes require a web server to serve files (CORS</a:t>
-            </a:r>
-            <a:r>
-              <a:rPr lang="en-US" dirty="0" smtClean="0"/>
-              <a:t>), don’t try to run locally</a:t>
-            </a:r>
-            <a:endParaRPr lang="en-US" dirty="0" smtClean="0"/>
-          </a:p>
-          <a:p>
-            <a:endParaRPr lang="en-US" dirty="0" smtClean="0"/>
-          </a:p>
-          <a:p>
-            <a:r>
-              <a:rPr lang="en-US" dirty="0" smtClean="0"/>
-              <a:t>Code It! (Add to sample2.html to integrate notes with </a:t>
-            </a:r>
-            <a:r>
-              <a:rPr lang="en-US" dirty="0" err="1" smtClean="0"/>
-              <a:t>todo</a:t>
-            </a:r>
-            <a:r>
-              <a:rPr lang="en-US" dirty="0" smtClean="0"/>
-              <a:t>)</a:t>
-            </a:r>
+              <a:t>directive with $scope as the glue</a:t>
+            </a:r>
+          </a:p>
+          <a:p>
             <a:endParaRPr lang="en-US" dirty="0"/>
+          </a:p>
+          <a:p>
+            <a:r>
+              <a:rPr lang="en-US" dirty="0" smtClean="0"/>
+              <a:t>Code it! (sample2.html)</a:t>
+            </a:r>
           </a:p>
         </p:txBody>
       </p:sp>
     </p:spTree>
     <p:extLst>
       <p:ext uri="{BB962C8B-B14F-4D97-AF65-F5344CB8AC3E}">
-        <p14:creationId xmlns:p14="http://schemas.microsoft.com/office/powerpoint/2010/main" val="416360939"/>
+        <p14:creationId xmlns:p14="http://schemas.microsoft.com/office/powerpoint/2010/main" val="2835322995"/>
       </p:ext>
     </p:extLst>
   </p:cSld>
@@ -4162,12 +4080,14 @@
         </p:nvSpPr>
         <p:spPr/>
         <p:txBody>
-          <a:bodyPr/>
-          <a:lstStyle/>
-          <a:p>
-            <a:r>
-              <a:rPr lang="en-US" dirty="0" smtClean="0"/>
-              <a:t>Scaffolding</a:t>
+          <a:bodyPr>
+            <a:normAutofit fontScale="90000"/>
+          </a:bodyPr>
+          <a:lstStyle/>
+          <a:p>
+            <a:r>
+              <a:rPr lang="en-US" dirty="0" smtClean="0"/>
+              <a:t>A Note on Dependency Injection</a:t>
             </a:r>
             <a:endParaRPr lang="en-US" dirty="0"/>
           </a:p>
@@ -4190,68 +4110,110 @@
           <a:p>
             <a:r>
               <a:rPr lang="en-US" dirty="0" err="1" smtClean="0"/>
-              <a:t>Yoeman</a:t>
-            </a:r>
-            <a:endParaRPr lang="en-US" dirty="0" smtClean="0"/>
+              <a:t>Angular’s</a:t>
+            </a:r>
+            <a:r>
+              <a:rPr lang="en-US" dirty="0" smtClean="0"/>
+              <a:t> way of “injecting” objects into your controllers, factories, etc.</a:t>
+            </a:r>
+          </a:p>
+          <a:p>
+            <a:r>
+              <a:rPr lang="en-US" dirty="0" smtClean="0"/>
+              <a:t>Very powerful, </a:t>
+            </a:r>
+            <a:r>
+              <a:rPr lang="en-US" dirty="0" err="1" smtClean="0"/>
+              <a:t>kinda</a:t>
+            </a:r>
+            <a:r>
+              <a:rPr lang="en-US" dirty="0" smtClean="0"/>
+              <a:t> complicated, makes your life easier!</a:t>
+            </a:r>
           </a:p>
           <a:p>
             <a:pPr lvl="1"/>
             <a:r>
+              <a:rPr lang="en-US" dirty="0" smtClean="0"/>
+              <a:t>.controller(“</a:t>
+            </a:r>
+            <a:r>
               <a:rPr lang="en-US" dirty="0" err="1" smtClean="0"/>
-              <a:t>NodeJS</a:t>
-            </a:r>
-            <a:endParaRPr lang="en-US" dirty="0" smtClean="0"/>
+              <a:t>AppService</a:t>
+            </a:r>
+            <a:r>
+              <a:rPr lang="en-US" dirty="0" smtClean="0"/>
+              <a:t>”,function(</a:t>
+            </a:r>
+            <a:r>
+              <a:rPr lang="en-US" dirty="0" err="1" smtClean="0"/>
+              <a:t>myAppService</a:t>
+            </a:r>
+            <a:r>
+              <a:rPr lang="en-US" dirty="0" smtClean="0"/>
+              <a:t>){ … });</a:t>
+            </a:r>
           </a:p>
           <a:p>
             <a:pPr lvl="1"/>
             <a:r>
               <a:rPr lang="en-US" dirty="0" smtClean="0"/>
-              <a:t>Grunt</a:t>
+              <a:t>.factory(“</a:t>
+            </a:r>
+            <a:r>
+              <a:rPr lang="en-US" dirty="0" err="1" smtClean="0"/>
+              <a:t>AnotherFactory</a:t>
+            </a:r>
+            <a:r>
+              <a:rPr lang="en-US" dirty="0" smtClean="0"/>
+              <a:t>”,function(</a:t>
+            </a:r>
+            <a:r>
+              <a:rPr lang="en-US" dirty="0" err="1" smtClean="0"/>
+              <a:t>otherFactory</a:t>
+            </a:r>
+            <a:r>
+              <a:rPr lang="en-US" dirty="0" smtClean="0"/>
+              <a:t>){ …});</a:t>
             </a:r>
           </a:p>
           <a:p>
             <a:pPr lvl="1"/>
             <a:r>
               <a:rPr lang="en-US" dirty="0" smtClean="0"/>
-              <a:t>Bower</a:t>
-            </a:r>
-          </a:p>
-          <a:p>
+              <a:t>.service(function($</a:t>
+            </a:r>
             <a:r>
               <a:rPr lang="en-US" dirty="0" err="1" smtClean="0"/>
-              <a:t>NodeJS</a:t>
-            </a:r>
-            <a:r>
-              <a:rPr lang="en-US" dirty="0" smtClean="0"/>
-              <a:t> is required </a:t>
+              <a:t>scope,$http</a:t>
+            </a:r>
+            <a:r>
+              <a:rPr lang="en-US" dirty="0" smtClean="0"/>
+              <a:t>){ … }) </a:t>
+            </a:r>
+          </a:p>
+          <a:p>
+            <a:pPr marL="320040" lvl="1" indent="0">
+              <a:buNone/>
+            </a:pPr>
+            <a:r>
+              <a:rPr lang="en-US" dirty="0"/>
+              <a:t>	</a:t>
+            </a:r>
+            <a:r>
+              <a:rPr lang="en-US" dirty="0" smtClean="0"/>
+              <a:t>					</a:t>
             </a:r>
           </a:p>
           <a:p>
             <a:endParaRPr lang="en-US" dirty="0"/>
-          </a:p>
-          <a:p>
-            <a:r>
-              <a:rPr lang="en-US" dirty="0" smtClean="0"/>
-              <a:t>Code it!</a:t>
-            </a:r>
-            <a:endParaRPr lang="en-US" dirty="0"/>
-          </a:p>
-          <a:p>
-            <a:pPr marL="320040" lvl="1" indent="0">
-              <a:buNone/>
-            </a:pPr>
-            <a:r>
-              <a:rPr lang="en-US" dirty="0"/>
-              <a:t>	</a:t>
-            </a:r>
-            <a:endParaRPr lang="en-US" dirty="0" smtClean="0"/>
           </a:p>
         </p:txBody>
       </p:sp>
     </p:spTree>
     <p:extLst>
       <p:ext uri="{BB962C8B-B14F-4D97-AF65-F5344CB8AC3E}">
-        <p14:creationId xmlns:p14="http://schemas.microsoft.com/office/powerpoint/2010/main" val="650019994"/>
+        <p14:creationId xmlns:p14="http://schemas.microsoft.com/office/powerpoint/2010/main" val="2214402365"/>
       </p:ext>
     </p:extLst>
   </p:cSld>
@@ -4290,6 +4252,416 @@
         </p:nvSpPr>
         <p:spPr/>
         <p:txBody>
+          <a:bodyPr>
+            <a:normAutofit/>
+          </a:bodyPr>
+          <a:lstStyle/>
+          <a:p>
+            <a:r>
+              <a:rPr lang="en-US" dirty="0" smtClean="0"/>
+              <a:t>Factories and Services</a:t>
+            </a:r>
+            <a:endParaRPr lang="en-US" dirty="0"/>
+          </a:p>
+        </p:txBody>
+      </p:sp>
+      <p:sp>
+        <p:nvSpPr>
+          <p:cNvPr id="3" name="Content Placeholder 2"/>
+          <p:cNvSpPr>
+            <a:spLocks noGrp="1"/>
+          </p:cNvSpPr>
+          <p:nvPr>
+            <p:ph idx="1"/>
+          </p:nvPr>
+        </p:nvSpPr>
+        <p:spPr/>
+        <p:txBody>
+          <a:bodyPr>
+            <a:normAutofit lnSpcReduction="10000"/>
+          </a:bodyPr>
+          <a:lstStyle/>
+          <a:p>
+            <a:r>
+              <a:rPr lang="en-US" dirty="0" smtClean="0"/>
+              <a:t>Used to share code across your app</a:t>
+            </a:r>
+          </a:p>
+          <a:p>
+            <a:r>
+              <a:rPr lang="en-US" dirty="0" smtClean="0"/>
+              <a:t>Dependency injection</a:t>
+            </a:r>
+          </a:p>
+          <a:p>
+            <a:r>
+              <a:rPr lang="en-US" dirty="0" smtClean="0"/>
+              <a:t>Singletons</a:t>
+            </a:r>
+          </a:p>
+          <a:p>
+            <a:r>
+              <a:rPr lang="en-US" dirty="0" smtClean="0"/>
+              <a:t>Can represent a </a:t>
+            </a:r>
+            <a:r>
+              <a:rPr lang="en-US" dirty="0" err="1" smtClean="0"/>
+              <a:t>RESTful</a:t>
+            </a:r>
+            <a:r>
+              <a:rPr lang="en-US" dirty="0" smtClean="0"/>
+              <a:t> client</a:t>
+            </a:r>
+          </a:p>
+          <a:p>
+            <a:r>
+              <a:rPr lang="en-US" dirty="0" smtClean="0"/>
+              <a:t>Factory = Object or function that is already built, use in your code</a:t>
+            </a:r>
+          </a:p>
+          <a:p>
+            <a:r>
+              <a:rPr lang="en-US" dirty="0" smtClean="0"/>
+              <a:t>Service= Object that needs some customization. </a:t>
+            </a:r>
+          </a:p>
+          <a:p>
+            <a:r>
+              <a:rPr lang="en-US" dirty="0" smtClean="0"/>
+              <a:t>Interchangeable for the most part. Use factory when in doubt.</a:t>
+            </a:r>
+          </a:p>
+          <a:p>
+            <a:endParaRPr lang="en-US" dirty="0"/>
+          </a:p>
+          <a:p>
+            <a:r>
+              <a:rPr lang="en-US" dirty="0" smtClean="0"/>
+              <a:t>Code it! (sample2-with-factory.html)</a:t>
+            </a:r>
+          </a:p>
+          <a:p>
+            <a:endParaRPr lang="en-US" dirty="0" smtClean="0"/>
+          </a:p>
+        </p:txBody>
+      </p:sp>
+    </p:spTree>
+    <p:extLst>
+      <p:ext uri="{BB962C8B-B14F-4D97-AF65-F5344CB8AC3E}">
+        <p14:creationId xmlns:p14="http://schemas.microsoft.com/office/powerpoint/2010/main" val="1720601796"/>
+      </p:ext>
+    </p:extLst>
+  </p:cSld>
+  <p:clrMapOvr>
+    <a:masterClrMapping/>
+  </p:clrMapOvr>
+</p:sld>
+</file>
+
+<file path=ppt/slides/slide15.xml><?xml version="1.0" encoding="utf-8"?>
+<p:sld xmlns:a="http://schemas.openxmlformats.org/drawingml/2006/main" xmlns:r="http://schemas.openxmlformats.org/officeDocument/2006/relationships" xmlns:p="http://schemas.openxmlformats.org/presentationml/2006/main">
+  <p:cSld>
+    <p:spTree>
+      <p:nvGrpSpPr>
+        <p:cNvPr id="1" name=""/>
+        <p:cNvGrpSpPr/>
+        <p:nvPr/>
+      </p:nvGrpSpPr>
+      <p:grpSpPr>
+        <a:xfrm>
+          <a:off x="0" y="0"/>
+          <a:ext cx="0" cy="0"/>
+          <a:chOff x="0" y="0"/>
+          <a:chExt cx="0" cy="0"/>
+        </a:xfrm>
+      </p:grpSpPr>
+      <p:sp>
+        <p:nvSpPr>
+          <p:cNvPr id="2" name="Title 1"/>
+          <p:cNvSpPr>
+            <a:spLocks noGrp="1"/>
+          </p:cNvSpPr>
+          <p:nvPr>
+            <p:ph type="title"/>
+          </p:nvPr>
+        </p:nvSpPr>
+        <p:spPr/>
+        <p:txBody>
+          <a:bodyPr/>
+          <a:lstStyle/>
+          <a:p>
+            <a:r>
+              <a:rPr lang="en-US" dirty="0" smtClean="0"/>
+              <a:t>Bring it Together with Routes</a:t>
+            </a:r>
+            <a:endParaRPr lang="en-US" dirty="0"/>
+          </a:p>
+        </p:txBody>
+      </p:sp>
+      <p:sp>
+        <p:nvSpPr>
+          <p:cNvPr id="3" name="Content Placeholder 2"/>
+          <p:cNvSpPr>
+            <a:spLocks noGrp="1"/>
+          </p:cNvSpPr>
+          <p:nvPr>
+            <p:ph idx="1"/>
+          </p:nvPr>
+        </p:nvSpPr>
+        <p:spPr/>
+        <p:txBody>
+          <a:bodyPr/>
+          <a:lstStyle/>
+          <a:p>
+            <a:r>
+              <a:rPr lang="en-US" dirty="0" smtClean="0"/>
+              <a:t>Routes allow for deep linking into your single page apps.</a:t>
+            </a:r>
+          </a:p>
+          <a:p>
+            <a:r>
+              <a:rPr lang="en-US" dirty="0" smtClean="0"/>
+              <a:t>Or more simply, they’re links to pages.</a:t>
+            </a:r>
+          </a:p>
+          <a:p>
+            <a:r>
+              <a:rPr lang="en-US" dirty="0" smtClean="0"/>
+              <a:t>Use partials (html files) and </a:t>
+            </a:r>
+            <a:r>
+              <a:rPr lang="en-US" dirty="0" err="1" smtClean="0"/>
+              <a:t>ng</a:t>
+            </a:r>
+            <a:r>
+              <a:rPr lang="en-US" dirty="0" smtClean="0"/>
+              <a:t>-view (directive) to show routes</a:t>
+            </a:r>
+          </a:p>
+          <a:p>
+            <a:r>
+              <a:rPr lang="en-US" dirty="0" smtClean="0"/>
+              <a:t>Don’t forget to include </a:t>
+            </a:r>
+            <a:r>
+              <a:rPr lang="en-US" dirty="0" err="1" smtClean="0"/>
+              <a:t>ngroute.js</a:t>
+            </a:r>
+            <a:r>
+              <a:rPr lang="en-US" dirty="0"/>
+              <a:t> </a:t>
+            </a:r>
+            <a:r>
+              <a:rPr lang="en-US" dirty="0" smtClean="0"/>
+              <a:t>and inject it as a dependency </a:t>
+            </a:r>
+            <a:endParaRPr lang="en-US" dirty="0" smtClean="0"/>
+          </a:p>
+          <a:p>
+            <a:r>
+              <a:rPr lang="en-US" dirty="0" smtClean="0"/>
+              <a:t>Also</a:t>
+            </a:r>
+            <a:r>
+              <a:rPr lang="en-US" dirty="0" smtClean="0"/>
+              <a:t>, routes require a web server to serve files (CORS</a:t>
+            </a:r>
+            <a:r>
+              <a:rPr lang="en-US" dirty="0" smtClean="0"/>
+              <a:t>), don’t try to run locally</a:t>
+            </a:r>
+            <a:endParaRPr lang="en-US" dirty="0" smtClean="0"/>
+          </a:p>
+          <a:p>
+            <a:endParaRPr lang="en-US" dirty="0" smtClean="0"/>
+          </a:p>
+          <a:p>
+            <a:r>
+              <a:rPr lang="en-US" dirty="0" smtClean="0"/>
+              <a:t>Code It! (Add to sample2.html to integrate notes with </a:t>
+            </a:r>
+            <a:r>
+              <a:rPr lang="en-US" dirty="0" err="1" smtClean="0"/>
+              <a:t>todo</a:t>
+            </a:r>
+            <a:r>
+              <a:rPr lang="en-US" dirty="0" smtClean="0"/>
+              <a:t>)</a:t>
+            </a:r>
+            <a:endParaRPr lang="en-US" dirty="0"/>
+          </a:p>
+        </p:txBody>
+      </p:sp>
+    </p:spTree>
+    <p:extLst>
+      <p:ext uri="{BB962C8B-B14F-4D97-AF65-F5344CB8AC3E}">
+        <p14:creationId xmlns:p14="http://schemas.microsoft.com/office/powerpoint/2010/main" val="416360939"/>
+      </p:ext>
+    </p:extLst>
+  </p:cSld>
+  <p:clrMapOvr>
+    <a:masterClrMapping/>
+  </p:clrMapOvr>
+</p:sld>
+</file>
+
+<file path=ppt/slides/slide16.xml><?xml version="1.0" encoding="utf-8"?>
+<p:sld xmlns:a="http://schemas.openxmlformats.org/drawingml/2006/main" xmlns:r="http://schemas.openxmlformats.org/officeDocument/2006/relationships" xmlns:p="http://schemas.openxmlformats.org/presentationml/2006/main">
+  <p:cSld>
+    <p:spTree>
+      <p:nvGrpSpPr>
+        <p:cNvPr id="1" name=""/>
+        <p:cNvGrpSpPr/>
+        <p:nvPr/>
+      </p:nvGrpSpPr>
+      <p:grpSpPr>
+        <a:xfrm>
+          <a:off x="0" y="0"/>
+          <a:ext cx="0" cy="0"/>
+          <a:chOff x="0" y="0"/>
+          <a:chExt cx="0" cy="0"/>
+        </a:xfrm>
+      </p:grpSpPr>
+      <p:sp>
+        <p:nvSpPr>
+          <p:cNvPr id="2" name="Title 1"/>
+          <p:cNvSpPr>
+            <a:spLocks noGrp="1"/>
+          </p:cNvSpPr>
+          <p:nvPr>
+            <p:ph type="title"/>
+          </p:nvPr>
+        </p:nvSpPr>
+        <p:spPr/>
+        <p:txBody>
+          <a:bodyPr/>
+          <a:lstStyle/>
+          <a:p>
+            <a:r>
+              <a:rPr lang="en-US" dirty="0" smtClean="0"/>
+              <a:t>Scaffolding</a:t>
+            </a:r>
+            <a:endParaRPr lang="en-US" dirty="0"/>
+          </a:p>
+        </p:txBody>
+      </p:sp>
+      <p:sp>
+        <p:nvSpPr>
+          <p:cNvPr id="3" name="Content Placeholder 2"/>
+          <p:cNvSpPr>
+            <a:spLocks noGrp="1"/>
+          </p:cNvSpPr>
+          <p:nvPr>
+            <p:ph idx="1"/>
+          </p:nvPr>
+        </p:nvSpPr>
+        <p:spPr/>
+        <p:txBody>
+          <a:bodyPr/>
+          <a:lstStyle/>
+          <a:p>
+            <a:r>
+              <a:rPr lang="en-US" dirty="0" err="1" smtClean="0"/>
+              <a:t>Yoeman</a:t>
+            </a:r>
+            <a:endParaRPr lang="en-US" dirty="0" smtClean="0"/>
+          </a:p>
+          <a:p>
+            <a:pPr lvl="1"/>
+            <a:r>
+              <a:rPr lang="en-US" dirty="0" err="1" smtClean="0"/>
+              <a:t>NodeJS</a:t>
+            </a:r>
+            <a:endParaRPr lang="en-US" dirty="0" smtClean="0"/>
+          </a:p>
+          <a:p>
+            <a:pPr lvl="1"/>
+            <a:r>
+              <a:rPr lang="en-US" dirty="0" smtClean="0"/>
+              <a:t>Grunt</a:t>
+            </a:r>
+          </a:p>
+          <a:p>
+            <a:pPr lvl="1"/>
+            <a:r>
+              <a:rPr lang="en-US" dirty="0" smtClean="0"/>
+              <a:t>Bower</a:t>
+            </a:r>
+          </a:p>
+          <a:p>
+            <a:r>
+              <a:rPr lang="en-US" dirty="0" err="1" smtClean="0"/>
+              <a:t>NodeJS</a:t>
+            </a:r>
+            <a:r>
+              <a:rPr lang="en-US" dirty="0" smtClean="0"/>
+              <a:t> is required </a:t>
+            </a:r>
+          </a:p>
+          <a:p>
+            <a:endParaRPr lang="en-US" dirty="0"/>
+          </a:p>
+          <a:p>
+            <a:r>
+              <a:rPr lang="en-US" dirty="0" smtClean="0"/>
+              <a:t>Code it!</a:t>
+            </a:r>
+            <a:endParaRPr lang="en-US" dirty="0"/>
+          </a:p>
+          <a:p>
+            <a:pPr marL="320040" lvl="1" indent="0">
+              <a:buNone/>
+            </a:pPr>
+            <a:r>
+              <a:rPr lang="en-US" dirty="0"/>
+              <a:t>	</a:t>
+            </a:r>
+            <a:endParaRPr lang="en-US" dirty="0" smtClean="0"/>
+          </a:p>
+        </p:txBody>
+      </p:sp>
+    </p:spTree>
+    <p:extLst>
+      <p:ext uri="{BB962C8B-B14F-4D97-AF65-F5344CB8AC3E}">
+        <p14:creationId xmlns:p14="http://schemas.microsoft.com/office/powerpoint/2010/main" val="650019994"/>
+      </p:ext>
+    </p:extLst>
+  </p:cSld>
+  <p:clrMapOvr>
+    <a:masterClrMapping/>
+  </p:clrMapOvr>
+</p:sld>
+</file>
+
+<file path=ppt/slides/slide17.xml><?xml version="1.0" encoding="utf-8"?>
+<p:sld xmlns:a="http://schemas.openxmlformats.org/drawingml/2006/main" xmlns:r="http://schemas.openxmlformats.org/officeDocument/2006/relationships" xmlns:p="http://schemas.openxmlformats.org/presentationml/2006/main">
+  <p:cSld>
+    <p:spTree>
+      <p:nvGrpSpPr>
+        <p:cNvPr id="1" name=""/>
+        <p:cNvGrpSpPr/>
+        <p:nvPr/>
+      </p:nvGrpSpPr>
+      <p:grpSpPr>
+        <a:xfrm>
+          <a:off x="0" y="0"/>
+          <a:ext cx="0" cy="0"/>
+          <a:chOff x="0" y="0"/>
+          <a:chExt cx="0" cy="0"/>
+        </a:xfrm>
+      </p:grpSpPr>
+      <p:sp>
+        <p:nvSpPr>
+          <p:cNvPr id="2" name="Title 1"/>
+          <p:cNvSpPr>
+            <a:spLocks noGrp="1"/>
+          </p:cNvSpPr>
+          <p:nvPr>
+            <p:ph type="title"/>
+          </p:nvPr>
+        </p:nvSpPr>
+        <p:spPr/>
+        <p:txBody>
           <a:bodyPr/>
           <a:lstStyle/>
           <a:p>
@@ -4391,7 +4763,7 @@
 </p:sld>
 </file>
 
-<file path=ppt/slides/slide15.xml><?xml version="1.0" encoding="utf-8"?>
+<file path=ppt/slides/slide18.xml><?xml version="1.0" encoding="utf-8"?>
 <p:sld xmlns:a="http://schemas.openxmlformats.org/drawingml/2006/main" xmlns:r="http://schemas.openxmlformats.org/officeDocument/2006/relationships" xmlns:p="http://schemas.openxmlformats.org/presentationml/2006/main">
   <p:cSld>
     <p:spTree>
@@ -4957,51 +5329,70 @@
           <a:p>
             <a:r>
               <a:rPr lang="en-US" dirty="0" smtClean="0"/>
-              <a:t>A note on Team </a:t>
-            </a:r>
+              <a:t>A Note on SPA</a:t>
+            </a:r>
+            <a:endParaRPr lang="en-US" dirty="0"/>
+          </a:p>
+        </p:txBody>
+      </p:sp>
+      <p:sp>
+        <p:nvSpPr>
+          <p:cNvPr id="3" name="Content Placeholder 2"/>
+          <p:cNvSpPr>
+            <a:spLocks noGrp="1"/>
+          </p:cNvSpPr>
+          <p:nvPr>
+            <p:ph idx="1"/>
+          </p:nvPr>
+        </p:nvSpPr>
+        <p:spPr/>
+        <p:txBody>
+          <a:bodyPr/>
+          <a:lstStyle/>
+          <a:p>
+            <a:r>
+              <a:rPr lang="en-US" dirty="0" smtClean="0"/>
+              <a:t>SPA = Single Page Applications</a:t>
+            </a:r>
+          </a:p>
+          <a:p>
+            <a:r>
+              <a:rPr lang="en-US" dirty="0" smtClean="0"/>
+              <a:t>Load time and server load is greatly reduced</a:t>
+            </a:r>
+          </a:p>
+          <a:p>
             <a:r>
               <a:rPr lang="en-US" dirty="0" err="1" smtClean="0"/>
-              <a:t>Collab</a:t>
-            </a:r>
-            <a:endParaRPr lang="en-US" dirty="0"/>
-          </a:p>
-        </p:txBody>
-      </p:sp>
-      <p:sp>
-        <p:nvSpPr>
-          <p:cNvPr id="3" name="Content Placeholder 2"/>
-          <p:cNvSpPr>
-            <a:spLocks noGrp="1"/>
-          </p:cNvSpPr>
-          <p:nvPr>
-            <p:ph idx="1"/>
-          </p:nvPr>
-        </p:nvSpPr>
-        <p:spPr/>
-        <p:txBody>
-          <a:bodyPr/>
-          <a:lstStyle/>
-          <a:p>
-            <a:r>
-              <a:rPr lang="en-US" dirty="0" smtClean="0"/>
-              <a:t>Using frameworks allows us to work more together, faster</a:t>
-            </a:r>
-          </a:p>
-          <a:p>
-            <a:r>
-              <a:rPr lang="en-US" dirty="0" smtClean="0"/>
-              <a:t>Using a consistent scaffolding will keep our code cleaner and more uniform</a:t>
-            </a:r>
+              <a:t>Rooms.ucmerced.edu</a:t>
+            </a:r>
+            <a:endParaRPr lang="en-US" dirty="0" smtClean="0"/>
           </a:p>
           <a:p>
             <a:pPr lvl="1"/>
             <a:r>
               <a:rPr lang="en-US" dirty="0" smtClean="0"/>
-              <a:t>Yeoman (shown later)</a:t>
-            </a:r>
-          </a:p>
-          <a:p>
-            <a:endParaRPr lang="en-US" dirty="0" smtClean="0"/>
+              <a:t>Header/footer/side bar are static “widgets” on every page</a:t>
+            </a:r>
+          </a:p>
+          <a:p>
+            <a:pPr lvl="1"/>
+            <a:r>
+              <a:rPr lang="en-US" dirty="0" smtClean="0"/>
+              <a:t>Show it</a:t>
+            </a:r>
+          </a:p>
+          <a:p>
+            <a:r>
+              <a:rPr lang="en-US" dirty="0" smtClean="0"/>
+              <a:t>Rooms application is fairly simple, what about a page with 100 widgets?</a:t>
+            </a:r>
+          </a:p>
+          <a:p>
+            <a:r>
+              <a:rPr lang="en-US" dirty="0" smtClean="0"/>
+              <a:t>Angular modules to the rescue</a:t>
+            </a:r>
           </a:p>
           <a:p>
             <a:endParaRPr lang="en-US" dirty="0"/>
@@ -5011,7 +5402,7 @@
     </p:spTree>
     <p:extLst>
       <p:ext uri="{BB962C8B-B14F-4D97-AF65-F5344CB8AC3E}">
-        <p14:creationId xmlns:p14="http://schemas.microsoft.com/office/powerpoint/2010/main" val="290078575"/>
+        <p14:creationId xmlns:p14="http://schemas.microsoft.com/office/powerpoint/2010/main" val="3790359322"/>
       </p:ext>
     </p:extLst>
   </p:cSld>
@@ -5055,7 +5446,11 @@
           <a:p>
             <a:r>
               <a:rPr lang="en-US" dirty="0" smtClean="0"/>
-              <a:t>A Note on SPA</a:t>
+              <a:t>A note on Team </a:t>
+            </a:r>
+            <a:r>
+              <a:rPr lang="en-US" dirty="0" err="1" smtClean="0"/>
+              <a:t>Collab</a:t>
             </a:r>
             <a:endParaRPr lang="en-US" dirty="0"/>
           </a:p>
@@ -5078,47 +5473,30 @@
           <a:p>
             <a:r>
               <a:rPr lang="en-US" dirty="0" smtClean="0"/>
-              <a:t>SPA = Single Page Applications</a:t>
-            </a:r>
-          </a:p>
-          <a:p>
-            <a:r>
-              <a:rPr lang="en-US" dirty="0" smtClean="0"/>
-              <a:t>Load time and server load is greatly reduced</a:t>
-            </a:r>
-          </a:p>
-          <a:p>
-            <a:r>
-              <a:rPr lang="en-US" dirty="0" err="1" smtClean="0"/>
-              <a:t>Rooms.ucmerced.edu</a:t>
-            </a:r>
+              <a:t>Using frameworks allows us to work more together, faster</a:t>
+            </a:r>
+          </a:p>
+          <a:p>
+            <a:r>
+              <a:rPr lang="en-US" dirty="0" smtClean="0"/>
+              <a:t>Code organization!</a:t>
+            </a:r>
+          </a:p>
+          <a:p>
+            <a:r>
+              <a:rPr lang="en-US" dirty="0" smtClean="0"/>
+              <a:t>Using a consistent scaffolding will keep our code cleaner and more uniform</a:t>
+            </a:r>
+          </a:p>
+          <a:p>
+            <a:pPr lvl="1"/>
+            <a:r>
+              <a:rPr lang="en-US" dirty="0" smtClean="0"/>
+              <a:t>Yeoman (shown later)</a:t>
+            </a:r>
+          </a:p>
+          <a:p>
             <a:endParaRPr lang="en-US" dirty="0" smtClean="0"/>
-          </a:p>
-          <a:p>
-            <a:pPr lvl="1"/>
-            <a:r>
-              <a:rPr lang="en-US" dirty="0" smtClean="0"/>
-              <a:t>Header/footer/side bar are static “widgets” on every page</a:t>
-            </a:r>
-          </a:p>
-          <a:p>
-            <a:pPr lvl="1"/>
-            <a:r>
-              <a:rPr lang="en-US" dirty="0" smtClean="0"/>
-              <a:t>Show it</a:t>
-            </a:r>
-          </a:p>
-          <a:p>
-            <a:r>
-              <a:rPr lang="en-US" dirty="0" smtClean="0"/>
-              <a:t>Rooms application is fairly simple, what about a page with 100 widgets?</a:t>
-            </a:r>
-          </a:p>
-          <a:p>
-            <a:r>
-              <a:rPr lang="en-US" dirty="0" smtClean="0"/>
-              <a:t>Angular modules to the rescue</a:t>
-            </a:r>
           </a:p>
           <a:p>
             <a:endParaRPr lang="en-US" dirty="0"/>
@@ -5128,7 +5506,7 @@
     </p:spTree>
     <p:extLst>
       <p:ext uri="{BB962C8B-B14F-4D97-AF65-F5344CB8AC3E}">
-        <p14:creationId xmlns:p14="http://schemas.microsoft.com/office/powerpoint/2010/main" val="3790359322"/>
+        <p14:creationId xmlns:p14="http://schemas.microsoft.com/office/powerpoint/2010/main" val="290078575"/>
       </p:ext>
     </p:extLst>
   </p:cSld>
@@ -5167,12 +5545,26 @@
         </p:nvSpPr>
         <p:spPr/>
         <p:txBody>
-          <a:bodyPr/>
-          <a:lstStyle/>
-          <a:p>
-            <a:r>
-              <a:rPr lang="en-US" dirty="0" smtClean="0"/>
-              <a:t>Angular Html Elements</a:t>
+          <a:bodyPr>
+            <a:normAutofit fontScale="90000"/>
+          </a:bodyPr>
+          <a:lstStyle/>
+          <a:p>
+            <a:r>
+              <a:rPr lang="en-US" dirty="0" smtClean="0"/>
+              <a:t>Code Example No Angular </a:t>
+            </a:r>
+            <a:r>
+              <a:rPr lang="en-US" dirty="0" err="1" smtClean="0"/>
+              <a:t>Vs</a:t>
+            </a:r>
+            <a:r>
+              <a:rPr lang="en-US" dirty="0" smtClean="0"/>
+              <a:t> </a:t>
+            </a:r>
+            <a:r>
+              <a:rPr lang="en-US" dirty="0" err="1" smtClean="0"/>
+              <a:t>Angluar</a:t>
             </a:r>
             <a:endParaRPr lang="en-US" dirty="0"/>
           </a:p>
@@ -5195,95 +5587,36 @@
           <a:p>
             <a:r>
               <a:rPr lang="en-US" dirty="0" smtClean="0"/>
-              <a:t>Angular HTML Elements let you add new functionality to HTML.</a:t>
-            </a:r>
-          </a:p>
-          <a:p>
-            <a:r>
-              <a:rPr lang="en-US" dirty="0" smtClean="0"/>
-              <a:t>Helps keep your views simple</a:t>
-            </a:r>
-          </a:p>
-          <a:p>
-            <a:r>
-              <a:rPr lang="en-US" dirty="0" smtClean="0"/>
-              <a:t>Simple way to tie into controllers</a:t>
-            </a:r>
-          </a:p>
-          <a:p>
-            <a:r>
-              <a:rPr lang="en-US" dirty="0" smtClean="0"/>
-              <a:t>Directives!</a:t>
-            </a:r>
-          </a:p>
-          <a:p>
-            <a:r>
-              <a:rPr lang="en-US" dirty="0" err="1" smtClean="0"/>
-              <a:t>ngApp</a:t>
-            </a:r>
-            <a:r>
-              <a:rPr lang="en-US" dirty="0" smtClean="0"/>
-              <a:t>, </a:t>
-            </a:r>
-            <a:r>
-              <a:rPr lang="en-US" dirty="0" err="1" smtClean="0"/>
-              <a:t>ngController</a:t>
-            </a:r>
-            <a:r>
-              <a:rPr lang="en-US" dirty="0" smtClean="0"/>
-              <a:t>, custom directives</a:t>
-            </a:r>
-          </a:p>
-          <a:p>
-            <a:r>
-              <a:rPr lang="en-US" dirty="0" smtClean="0"/>
-              <a:t>Examples</a:t>
+              <a:t>First No Angular. Global variables are bad!</a:t>
             </a:r>
           </a:p>
           <a:p>
             <a:pPr lvl="1"/>
             <a:r>
               <a:rPr lang="en-US" dirty="0" smtClean="0"/>
-              <a:t>&lt;div data-</a:t>
-            </a:r>
-            <a:r>
-              <a:rPr lang="en-US" dirty="0" err="1" smtClean="0"/>
-              <a:t>ng</a:t>
-            </a:r>
-            <a:r>
-              <a:rPr lang="en-US" dirty="0" smtClean="0"/>
-              <a:t>-controller=“homepage”&gt;</a:t>
+              <a:t>Code is functional, but where does it go?</a:t>
             </a:r>
           </a:p>
           <a:p>
             <a:pPr lvl="1"/>
             <a:r>
               <a:rPr lang="en-US" dirty="0" smtClean="0"/>
-              <a:t>&lt;li </a:t>
-            </a:r>
-            <a:r>
-              <a:rPr lang="en-US" dirty="0" err="1" smtClean="0"/>
-              <a:t>ng</a:t>
-            </a:r>
-            <a:r>
-              <a:rPr lang="en-US" dirty="0" smtClean="0"/>
-              <a:t>-repeat=“</a:t>
-            </a:r>
-            <a:r>
-              <a:rPr lang="en-US" dirty="0" err="1" smtClean="0"/>
-              <a:t>myModel</a:t>
-            </a:r>
-            <a:r>
-              <a:rPr lang="en-US" dirty="0" smtClean="0"/>
-              <a:t>”&gt; …&lt;/li&gt;</a:t>
-            </a:r>
+              <a:t>Again, global variables are bad in JS!</a:t>
+            </a:r>
+          </a:p>
+          <a:p>
+            <a:r>
+              <a:rPr lang="en-US" dirty="0" smtClean="0"/>
+              <a:t>Second, Wrapped in angular structure</a:t>
+            </a:r>
+            <a:endParaRPr lang="en-US" dirty="0"/>
           </a:p>
         </p:txBody>
       </p:sp>
     </p:spTree>
     <p:extLst>
       <p:ext uri="{BB962C8B-B14F-4D97-AF65-F5344CB8AC3E}">
-        <p14:creationId xmlns:p14="http://schemas.microsoft.com/office/powerpoint/2010/main" val="2969772706"/>
+        <p14:creationId xmlns:p14="http://schemas.microsoft.com/office/powerpoint/2010/main" val="2927096993"/>
       </p:ext>
     </p:extLst>
   </p:cSld>
@@ -5312,7 +5645,500 @@
       </p:grpSpPr>
       <p:sp>
         <p:nvSpPr>
-          <p:cNvPr id="2" name="Title 1"/>
+          <p:cNvPr id="3" name="Content Placeholder 2"/>
+          <p:cNvSpPr>
+            <a:spLocks noGrp="1"/>
+          </p:cNvSpPr>
+          <p:nvPr>
+            <p:ph idx="1"/>
+          </p:nvPr>
+        </p:nvSpPr>
+        <p:spPr>
+          <a:xfrm>
+            <a:off x="914400" y="227923"/>
+            <a:ext cx="7315200" cy="6081438"/>
+          </a:xfrm>
+        </p:spPr>
+        <p:txBody>
+          <a:bodyPr>
+            <a:normAutofit fontScale="62500" lnSpcReduction="20000"/>
+          </a:bodyPr>
+          <a:lstStyle/>
+          <a:p>
+            <a:pPr marL="45720" indent="0">
+              <a:buNone/>
+            </a:pPr>
+            <a:r>
+              <a:rPr lang="nl-NL" dirty="0" smtClean="0"/>
+              <a:t>	</a:t>
+            </a:r>
+            <a:r>
+              <a:rPr lang="en-US" dirty="0"/>
+              <a:t>	</a:t>
+            </a:r>
+          </a:p>
+          <a:p>
+            <a:pPr marL="45720" indent="0">
+              <a:buNone/>
+            </a:pPr>
+            <a:r>
+              <a:rPr lang="en-US" dirty="0"/>
+              <a:t>// global variable​</a:t>
+            </a:r>
+          </a:p>
+          <a:p>
+            <a:pPr marL="45720" indent="0">
+              <a:buNone/>
+            </a:pPr>
+            <a:r>
+              <a:rPr lang="en-US" dirty="0"/>
+              <a:t>​</a:t>
+            </a:r>
+            <a:r>
+              <a:rPr lang="en-US" dirty="0" err="1"/>
+              <a:t>var</a:t>
+            </a:r>
+            <a:r>
+              <a:rPr lang="en-US" dirty="0"/>
+              <a:t> </a:t>
+            </a:r>
+            <a:r>
+              <a:rPr lang="en-US" dirty="0" err="1"/>
+              <a:t>allUserData</a:t>
+            </a:r>
+            <a:r>
+              <a:rPr lang="en-US" dirty="0"/>
+              <a:t> = [];</a:t>
+            </a:r>
+          </a:p>
+          <a:p>
+            <a:pPr marL="45720" indent="0">
+              <a:buNone/>
+            </a:pPr>
+            <a:r>
+              <a:rPr lang="en-US" dirty="0"/>
+              <a:t>​</a:t>
+            </a:r>
+          </a:p>
+          <a:p>
+            <a:pPr marL="45720" indent="0">
+              <a:buNone/>
+            </a:pPr>
+            <a:r>
+              <a:rPr lang="en-US" dirty="0"/>
+              <a:t>​// generic </a:t>
+            </a:r>
+            <a:r>
+              <a:rPr lang="en-US" dirty="0" err="1"/>
+              <a:t>logStuff</a:t>
+            </a:r>
+            <a:r>
+              <a:rPr lang="en-US" dirty="0"/>
+              <a:t> function that prints to console​</a:t>
+            </a:r>
+          </a:p>
+          <a:p>
+            <a:pPr marL="45720" indent="0">
+              <a:buNone/>
+            </a:pPr>
+            <a:r>
+              <a:rPr lang="en-US" dirty="0"/>
+              <a:t>​function </a:t>
+            </a:r>
+            <a:r>
+              <a:rPr lang="en-US" dirty="0" err="1"/>
+              <a:t>logStuff</a:t>
+            </a:r>
+            <a:r>
+              <a:rPr lang="en-US" dirty="0"/>
+              <a:t> (</a:t>
+            </a:r>
+            <a:r>
+              <a:rPr lang="en-US" dirty="0" err="1"/>
+              <a:t>userData</a:t>
+            </a:r>
+            <a:r>
+              <a:rPr lang="en-US" dirty="0"/>
+              <a:t>) {</a:t>
+            </a:r>
+          </a:p>
+          <a:p>
+            <a:pPr marL="45720" indent="0">
+              <a:buNone/>
+            </a:pPr>
+            <a:r>
+              <a:rPr lang="en-US" dirty="0"/>
+              <a:t>    if ( </a:t>
+            </a:r>
+            <a:r>
+              <a:rPr lang="en-US" dirty="0" err="1"/>
+              <a:t>typeof</a:t>
+            </a:r>
+            <a:r>
+              <a:rPr lang="en-US" dirty="0"/>
+              <a:t> </a:t>
+            </a:r>
+            <a:r>
+              <a:rPr lang="en-US" dirty="0" err="1"/>
+              <a:t>userData</a:t>
+            </a:r>
+            <a:r>
+              <a:rPr lang="en-US" dirty="0"/>
+              <a:t> === "string")</a:t>
+            </a:r>
+          </a:p>
+          <a:p>
+            <a:pPr marL="45720" indent="0">
+              <a:buNone/>
+            </a:pPr>
+            <a:r>
+              <a:rPr lang="en-US" dirty="0"/>
+              <a:t>    {</a:t>
+            </a:r>
+          </a:p>
+          <a:p>
+            <a:pPr marL="45720" indent="0">
+              <a:buNone/>
+            </a:pPr>
+            <a:r>
+              <a:rPr lang="en-US" dirty="0"/>
+              <a:t>        </a:t>
+            </a:r>
+            <a:r>
+              <a:rPr lang="en-US" dirty="0" err="1"/>
+              <a:t>console.log</a:t>
+            </a:r>
+            <a:r>
+              <a:rPr lang="en-US" dirty="0"/>
+              <a:t>(</a:t>
+            </a:r>
+            <a:r>
+              <a:rPr lang="en-US" dirty="0" err="1"/>
+              <a:t>userData</a:t>
+            </a:r>
+            <a:r>
+              <a:rPr lang="en-US" dirty="0"/>
+              <a:t>);</a:t>
+            </a:r>
+          </a:p>
+          <a:p>
+            <a:pPr marL="45720" indent="0">
+              <a:buNone/>
+            </a:pPr>
+            <a:r>
+              <a:rPr lang="en-US" dirty="0"/>
+              <a:t>    }</a:t>
+            </a:r>
+          </a:p>
+          <a:p>
+            <a:pPr marL="45720" indent="0">
+              <a:buNone/>
+            </a:pPr>
+            <a:r>
+              <a:rPr lang="en-US" dirty="0"/>
+              <a:t>    else if ( </a:t>
+            </a:r>
+            <a:r>
+              <a:rPr lang="en-US" dirty="0" err="1"/>
+              <a:t>typeof</a:t>
+            </a:r>
+            <a:r>
+              <a:rPr lang="en-US" dirty="0"/>
+              <a:t> </a:t>
+            </a:r>
+            <a:r>
+              <a:rPr lang="en-US" dirty="0" err="1"/>
+              <a:t>userData</a:t>
+            </a:r>
+            <a:r>
+              <a:rPr lang="en-US" dirty="0"/>
+              <a:t> === "object")</a:t>
+            </a:r>
+          </a:p>
+          <a:p>
+            <a:pPr marL="45720" indent="0">
+              <a:buNone/>
+            </a:pPr>
+            <a:r>
+              <a:rPr lang="en-US" dirty="0"/>
+              <a:t>    {</a:t>
+            </a:r>
+          </a:p>
+          <a:p>
+            <a:pPr marL="45720" indent="0">
+              <a:buNone/>
+            </a:pPr>
+            <a:r>
+              <a:rPr lang="en-US" dirty="0"/>
+              <a:t>        for (</a:t>
+            </a:r>
+            <a:r>
+              <a:rPr lang="en-US" dirty="0" err="1"/>
+              <a:t>var</a:t>
+            </a:r>
+            <a:r>
+              <a:rPr lang="en-US" dirty="0"/>
+              <a:t> item in </a:t>
+            </a:r>
+            <a:r>
+              <a:rPr lang="en-US" dirty="0" err="1"/>
+              <a:t>userData</a:t>
+            </a:r>
+            <a:r>
+              <a:rPr lang="en-US" dirty="0"/>
+              <a:t>) {</a:t>
+            </a:r>
+          </a:p>
+          <a:p>
+            <a:pPr marL="45720" indent="0">
+              <a:buNone/>
+            </a:pPr>
+            <a:r>
+              <a:rPr lang="en-US" dirty="0"/>
+              <a:t>            </a:t>
+            </a:r>
+            <a:r>
+              <a:rPr lang="en-US" dirty="0" err="1"/>
+              <a:t>console.log</a:t>
+            </a:r>
+            <a:r>
+              <a:rPr lang="en-US" dirty="0"/>
+              <a:t>(item + ": " + </a:t>
+            </a:r>
+            <a:r>
+              <a:rPr lang="en-US" dirty="0" err="1"/>
+              <a:t>userData</a:t>
+            </a:r>
+            <a:r>
+              <a:rPr lang="en-US" dirty="0"/>
+              <a:t>[item]);</a:t>
+            </a:r>
+          </a:p>
+          <a:p>
+            <a:pPr marL="45720" indent="0">
+              <a:buNone/>
+            </a:pPr>
+            <a:r>
+              <a:rPr lang="en-US" dirty="0"/>
+              <a:t>        }</a:t>
+            </a:r>
+          </a:p>
+          <a:p>
+            <a:pPr marL="45720" indent="0">
+              <a:buNone/>
+            </a:pPr>
+            <a:r>
+              <a:rPr lang="en-US" dirty="0"/>
+              <a:t>​</a:t>
+            </a:r>
+          </a:p>
+          <a:p>
+            <a:pPr marL="45720" indent="0">
+              <a:buNone/>
+            </a:pPr>
+            <a:r>
+              <a:rPr lang="en-US" dirty="0"/>
+              <a:t>    }</a:t>
+            </a:r>
+          </a:p>
+          <a:p>
+            <a:pPr marL="45720" indent="0">
+              <a:buNone/>
+            </a:pPr>
+            <a:r>
+              <a:rPr lang="en-US" dirty="0"/>
+              <a:t>​</a:t>
+            </a:r>
+          </a:p>
+          <a:p>
+            <a:pPr marL="45720" indent="0">
+              <a:buNone/>
+            </a:pPr>
+            <a:r>
+              <a:rPr lang="en-US" dirty="0"/>
+              <a:t>}</a:t>
+            </a:r>
+          </a:p>
+          <a:p>
+            <a:pPr marL="45720" indent="0">
+              <a:buNone/>
+            </a:pPr>
+            <a:r>
+              <a:rPr lang="en-US" dirty="0"/>
+              <a:t>​</a:t>
+            </a:r>
+          </a:p>
+          <a:p>
+            <a:pPr marL="45720" indent="0">
+              <a:buNone/>
+            </a:pPr>
+            <a:r>
+              <a:rPr lang="en-US" dirty="0"/>
+              <a:t>​// A function that takes two parameters, the last one a callback function​</a:t>
+            </a:r>
+          </a:p>
+          <a:p>
+            <a:pPr marL="45720" indent="0">
+              <a:buNone/>
+            </a:pPr>
+            <a:r>
+              <a:rPr lang="en-US" dirty="0"/>
+              <a:t>​function </a:t>
+            </a:r>
+            <a:r>
+              <a:rPr lang="en-US" dirty="0" err="1"/>
+              <a:t>getInput</a:t>
+            </a:r>
+            <a:r>
+              <a:rPr lang="en-US" dirty="0"/>
+              <a:t> (options, callback) {</a:t>
+            </a:r>
+          </a:p>
+          <a:p>
+            <a:pPr marL="45720" indent="0">
+              <a:buNone/>
+            </a:pPr>
+            <a:r>
+              <a:rPr lang="en-US" dirty="0"/>
+              <a:t>    </a:t>
+            </a:r>
+            <a:r>
+              <a:rPr lang="en-US" dirty="0" err="1"/>
+              <a:t>allUserData.push</a:t>
+            </a:r>
+            <a:r>
+              <a:rPr lang="en-US" dirty="0"/>
+              <a:t> (options);</a:t>
+            </a:r>
+          </a:p>
+          <a:p>
+            <a:pPr marL="45720" indent="0">
+              <a:buNone/>
+            </a:pPr>
+            <a:r>
+              <a:rPr lang="en-US" dirty="0"/>
+              <a:t>    callback (options);</a:t>
+            </a:r>
+          </a:p>
+          <a:p>
+            <a:pPr marL="45720" indent="0">
+              <a:buNone/>
+            </a:pPr>
+            <a:r>
+              <a:rPr lang="en-US" dirty="0"/>
+              <a:t>​</a:t>
+            </a:r>
+          </a:p>
+          <a:p>
+            <a:pPr marL="45720" indent="0">
+              <a:buNone/>
+            </a:pPr>
+            <a:r>
+              <a:rPr lang="en-US" dirty="0"/>
+              <a:t>}</a:t>
+            </a:r>
+          </a:p>
+          <a:p>
+            <a:pPr marL="45720" indent="0">
+              <a:buNone/>
+            </a:pPr>
+            <a:r>
+              <a:rPr lang="en-US" dirty="0"/>
+              <a:t>​</a:t>
+            </a:r>
+          </a:p>
+          <a:p>
+            <a:pPr marL="45720" indent="0">
+              <a:buNone/>
+            </a:pPr>
+            <a:r>
+              <a:rPr lang="en-US" dirty="0"/>
+              <a:t>​// When we call the </a:t>
+            </a:r>
+            <a:r>
+              <a:rPr lang="en-US" dirty="0" err="1"/>
+              <a:t>getInput</a:t>
+            </a:r>
+            <a:r>
+              <a:rPr lang="en-US" dirty="0"/>
+              <a:t> function, we pass </a:t>
+            </a:r>
+            <a:r>
+              <a:rPr lang="en-US" dirty="0" err="1"/>
+              <a:t>logStuff</a:t>
+            </a:r>
+            <a:r>
+              <a:rPr lang="en-US" dirty="0"/>
+              <a:t> as a parameter.​</a:t>
+            </a:r>
+          </a:p>
+          <a:p>
+            <a:pPr marL="45720" indent="0">
+              <a:buNone/>
+            </a:pPr>
+            <a:r>
+              <a:rPr lang="en-US" dirty="0"/>
+              <a:t>​// So </a:t>
+            </a:r>
+            <a:r>
+              <a:rPr lang="en-US" dirty="0" err="1"/>
+              <a:t>logStuff</a:t>
+            </a:r>
+            <a:r>
+              <a:rPr lang="en-US" dirty="0"/>
+              <a:t> will be the function that will called back (or executed) inside the </a:t>
+            </a:r>
+            <a:r>
+              <a:rPr lang="en-US" dirty="0" err="1"/>
+              <a:t>getInput</a:t>
+            </a:r>
+            <a:r>
+              <a:rPr lang="en-US" dirty="0"/>
+              <a:t> function​</a:t>
+            </a:r>
+          </a:p>
+          <a:p>
+            <a:pPr marL="45720" indent="0">
+              <a:buNone/>
+            </a:pPr>
+            <a:r>
+              <a:rPr lang="en-US" dirty="0" err="1"/>
+              <a:t>getInput</a:t>
+            </a:r>
+            <a:r>
+              <a:rPr lang="en-US" dirty="0"/>
+              <a:t> ({</a:t>
+            </a:r>
+            <a:r>
+              <a:rPr lang="en-US" dirty="0" err="1"/>
+              <a:t>name:"Rich</a:t>
+            </a:r>
+            <a:r>
+              <a:rPr lang="en-US" dirty="0"/>
+              <a:t>", </a:t>
+            </a:r>
+            <a:r>
+              <a:rPr lang="en-US" dirty="0" err="1"/>
+              <a:t>speciality</a:t>
+            </a:r>
+            <a:r>
+              <a:rPr lang="en-US" dirty="0"/>
+              <a:t>:"JavaScript"}, </a:t>
+            </a:r>
+            <a:r>
+              <a:rPr lang="en-US" dirty="0" err="1"/>
+              <a:t>logStuff</a:t>
+            </a:r>
+            <a:r>
+              <a:rPr lang="en-US" dirty="0"/>
+              <a:t>);</a:t>
+            </a:r>
+          </a:p>
+        </p:txBody>
+      </p:sp>
+      <p:sp>
+        <p:nvSpPr>
+          <p:cNvPr id="4" name="Title 1"/>
           <p:cNvSpPr>
             <a:spLocks noGrp="1"/>
           </p:cNvSpPr>
@@ -5320,66 +6146,33 @@
             <p:ph type="title"/>
           </p:nvPr>
         </p:nvSpPr>
-        <p:spPr/>
-        <p:txBody>
-          <a:bodyPr/>
-          <a:lstStyle/>
-          <a:p>
-            <a:r>
-              <a:rPr lang="en-US" dirty="0" smtClean="0"/>
-              <a:t>What is 2 Way Data Binding? </a:t>
-            </a:r>
+        <p:spPr>
+          <a:xfrm>
+            <a:off x="914400" y="1544715"/>
+            <a:ext cx="7315200" cy="1154097"/>
+          </a:xfrm>
+        </p:spPr>
+        <p:txBody>
+          <a:bodyPr>
+            <a:normAutofit fontScale="90000"/>
+          </a:bodyPr>
+          <a:lstStyle/>
+          <a:p>
+            <a:r>
+              <a:rPr lang="en-US" dirty="0" smtClean="0"/>
+              <a:t/>
+            </a:r>
+            <a:br>
+              <a:rPr lang="en-US" dirty="0" smtClean="0"/>
+            </a:br>
             <a:endParaRPr lang="en-US" dirty="0"/>
-          </a:p>
-        </p:txBody>
-      </p:sp>
-      <p:sp>
-        <p:nvSpPr>
-          <p:cNvPr id="3" name="Content Placeholder 2"/>
-          <p:cNvSpPr>
-            <a:spLocks noGrp="1"/>
-          </p:cNvSpPr>
-          <p:nvPr>
-            <p:ph idx="1"/>
-          </p:nvPr>
-        </p:nvSpPr>
-        <p:spPr/>
-        <p:txBody>
-          <a:bodyPr/>
-          <a:lstStyle/>
-          <a:p>
-            <a:r>
-              <a:rPr lang="en-US" dirty="0" smtClean="0"/>
-              <a:t>Data-binding is an automatic way of updating the view whenever the model changes, as well as updating the model whenever the view changes.  </a:t>
-            </a:r>
-          </a:p>
-          <a:p>
-            <a:r>
-              <a:rPr lang="en-US" dirty="0" smtClean="0"/>
-              <a:t>The view is your html</a:t>
-            </a:r>
-          </a:p>
-          <a:p>
-            <a:pPr marL="45720" indent="0">
-              <a:buNone/>
-            </a:pPr>
-            <a:endParaRPr lang="en-US" dirty="0" smtClean="0"/>
-          </a:p>
-          <a:p>
-            <a:endParaRPr lang="en-US" dirty="0"/>
-          </a:p>
-          <a:p>
-            <a:r>
-              <a:rPr lang="en-US" dirty="0" smtClean="0"/>
-              <a:t>Code it! – sample1.html</a:t>
-            </a:r>
           </a:p>
         </p:txBody>
       </p:sp>
     </p:spTree>
     <p:extLst>
       <p:ext uri="{BB962C8B-B14F-4D97-AF65-F5344CB8AC3E}">
-        <p14:creationId xmlns:p14="http://schemas.microsoft.com/office/powerpoint/2010/main" val="3799675944"/>
+        <p14:creationId xmlns:p14="http://schemas.microsoft.com/office/powerpoint/2010/main" val="287753576"/>
       </p:ext>
     </p:extLst>
   </p:cSld>
@@ -5418,78 +6211,248 @@
         </p:nvSpPr>
         <p:spPr/>
         <p:txBody>
-          <a:bodyPr/>
-          <a:lstStyle/>
-          <a:p>
+          <a:bodyPr>
+            <a:normAutofit fontScale="90000"/>
+          </a:bodyPr>
+          <a:lstStyle/>
+          <a:p>
+            <a:r>
+              <a:rPr lang="en-US" dirty="0" smtClean="0"/>
+              <a:t/>
+            </a:r>
+            <a:br>
+              <a:rPr lang="en-US" dirty="0" smtClean="0"/>
+            </a:br>
+            <a:endParaRPr lang="en-US" dirty="0"/>
+          </a:p>
+        </p:txBody>
+      </p:sp>
+      <p:sp>
+        <p:nvSpPr>
+          <p:cNvPr id="3" name="Content Placeholder 2"/>
+          <p:cNvSpPr>
+            <a:spLocks noGrp="1"/>
+          </p:cNvSpPr>
+          <p:nvPr>
+            <p:ph idx="1"/>
+          </p:nvPr>
+        </p:nvSpPr>
+        <p:spPr>
+          <a:xfrm>
+            <a:off x="914400" y="472123"/>
+            <a:ext cx="7315200" cy="5837237"/>
+          </a:xfrm>
+        </p:spPr>
+        <p:txBody>
+          <a:bodyPr>
+            <a:normAutofit lnSpcReduction="10000"/>
+          </a:bodyPr>
+          <a:lstStyle/>
+          <a:p>
+            <a:r>
+              <a:rPr lang="en-US" dirty="0"/>
+              <a:t>//</a:t>
+            </a:r>
+            <a:r>
+              <a:rPr lang="en-US" dirty="0" err="1"/>
+              <a:t>Factory.js</a:t>
+            </a:r>
+            <a:endParaRPr lang="en-US" dirty="0"/>
+          </a:p>
+          <a:p>
+            <a:r>
+              <a:rPr lang="en-US" dirty="0" err="1"/>
+              <a:t>angular.module</a:t>
+            </a:r>
+            <a:r>
+              <a:rPr lang="en-US" dirty="0"/>
+              <a:t>("</a:t>
+            </a:r>
+            <a:r>
+              <a:rPr lang="en-US" dirty="0" err="1"/>
+              <a:t>todoApp</a:t>
+            </a:r>
+            <a:r>
+              <a:rPr lang="en-US" dirty="0"/>
+              <a:t>").factory("Log",["</a:t>
+            </a:r>
+            <a:r>
+              <a:rPr lang="en-US" dirty="0" err="1"/>
+              <a:t>LogWriter</a:t>
+            </a:r>
+            <a:r>
+              <a:rPr lang="en-US" dirty="0"/>
+              <a:t>",function(</a:t>
+            </a:r>
+            <a:r>
+              <a:rPr lang="en-US" dirty="0" err="1"/>
+              <a:t>logWriter</a:t>
+            </a:r>
+            <a:r>
+              <a:rPr lang="en-US" dirty="0"/>
+              <a:t>){</a:t>
+            </a:r>
+          </a:p>
+          <a:p>
+            <a:r>
+              <a:rPr lang="en-US" dirty="0"/>
+              <a:t>        ​//removes global variable. Important!</a:t>
+            </a:r>
+          </a:p>
+          <a:p>
+            <a:r>
+              <a:rPr lang="en-US" dirty="0"/>
+              <a:t>        </a:t>
+            </a:r>
+            <a:r>
+              <a:rPr lang="en-US" dirty="0" err="1"/>
+              <a:t>var</a:t>
+            </a:r>
+            <a:r>
+              <a:rPr lang="en-US" dirty="0"/>
+              <a:t> </a:t>
+            </a:r>
+            <a:r>
+              <a:rPr lang="en-US" dirty="0" err="1"/>
+              <a:t>allUserData</a:t>
+            </a:r>
+            <a:r>
+              <a:rPr lang="en-US" dirty="0"/>
+              <a:t> = [];</a:t>
+            </a:r>
+          </a:p>
+          <a:p>
+            <a:r>
+              <a:rPr lang="en-US" dirty="0"/>
+              <a:t>        return {</a:t>
+            </a:r>
+          </a:p>
+          <a:p>
+            <a:r>
+              <a:rPr lang="en-US" dirty="0"/>
+              <a:t>            </a:t>
+            </a:r>
+            <a:r>
+              <a:rPr lang="en-US" dirty="0" err="1"/>
+              <a:t>logStuff:function</a:t>
+            </a:r>
+            <a:r>
+              <a:rPr lang="en-US" dirty="0"/>
+              <a:t>(){ ... },</a:t>
+            </a:r>
+          </a:p>
+          <a:p>
+            <a:r>
+              <a:rPr lang="en-US" dirty="0"/>
+              <a:t>            </a:t>
+            </a:r>
+            <a:r>
+              <a:rPr lang="en-US" dirty="0" err="1"/>
+              <a:t>getInput:function</a:t>
+            </a:r>
+            <a:r>
+              <a:rPr lang="en-US" dirty="0"/>
+              <a:t>(){ ...}</a:t>
+            </a:r>
+          </a:p>
+          <a:p>
+            <a:r>
+              <a:rPr lang="en-US" dirty="0"/>
+              <a:t>        }</a:t>
+            </a:r>
+          </a:p>
+          <a:p>
+            <a:r>
+              <a:rPr lang="en-US" dirty="0"/>
+              <a:t>}]);</a:t>
+            </a:r>
+          </a:p>
+          <a:p>
+            <a:endParaRPr lang="en-US" dirty="0"/>
+          </a:p>
+          <a:p>
+            <a:r>
+              <a:rPr lang="en-US" dirty="0"/>
+              <a:t>//</a:t>
+            </a:r>
+            <a:r>
+              <a:rPr lang="en-US" dirty="0" err="1"/>
+              <a:t>Controller.js</a:t>
+            </a:r>
+            <a:endParaRPr lang="en-US" dirty="0"/>
+          </a:p>
+          <a:p>
+            <a:r>
+              <a:rPr lang="en-US" dirty="0" err="1"/>
+              <a:t>angular.module</a:t>
+            </a:r>
+            <a:r>
+              <a:rPr lang="en-US" dirty="0"/>
+              <a:t>('</a:t>
+            </a:r>
             <a:r>
               <a:rPr lang="en-US" dirty="0" err="1" smtClean="0"/>
-              <a:t>Conrollers</a:t>
-            </a:r>
-            <a:r>
-              <a:rPr lang="en-US" dirty="0" smtClean="0"/>
-              <a:t> Explained</a:t>
-            </a:r>
-            <a:endParaRPr lang="en-US" dirty="0"/>
-          </a:p>
-        </p:txBody>
-      </p:sp>
-      <p:sp>
-        <p:nvSpPr>
-          <p:cNvPr id="3" name="Content Placeholder 2"/>
-          <p:cNvSpPr>
-            <a:spLocks noGrp="1"/>
-          </p:cNvSpPr>
-          <p:nvPr>
-            <p:ph idx="1"/>
-          </p:nvPr>
-        </p:nvSpPr>
-        <p:spPr/>
-        <p:txBody>
-          <a:bodyPr/>
-          <a:lstStyle/>
-          <a:p>
-            <a:r>
-              <a:rPr lang="en-US" dirty="0" smtClean="0"/>
-              <a:t>The glue behind MVC – Links your view to your models</a:t>
-            </a:r>
-          </a:p>
-          <a:p>
-            <a:r>
-              <a:rPr lang="en-US" dirty="0" smtClean="0"/>
-              <a:t>Move DOM behavior out of the into a more readable place</a:t>
-            </a:r>
-          </a:p>
-          <a:p>
-            <a:r>
-              <a:rPr lang="en-US" dirty="0" smtClean="0"/>
-              <a:t>Link DOM and controllers to achieve 2 way data binding</a:t>
-            </a:r>
-          </a:p>
-          <a:p>
-            <a:r>
-              <a:rPr lang="en-US" dirty="0" smtClean="0"/>
-              <a:t>Use </a:t>
-            </a:r>
-            <a:r>
-              <a:rPr lang="en-US" dirty="0" err="1" smtClean="0"/>
-              <a:t>ngController</a:t>
-            </a:r>
-            <a:r>
-              <a:rPr lang="en-US" dirty="0"/>
-              <a:t> </a:t>
-            </a:r>
-            <a:r>
-              <a:rPr lang="en-US" dirty="0" smtClean="0"/>
-              <a:t>directive with $scope as the glue</a:t>
-            </a:r>
-          </a:p>
-          <a:p>
-            <a:endParaRPr lang="en-US" dirty="0"/>
-          </a:p>
-          <a:p>
-            <a:r>
-              <a:rPr lang="en-US" dirty="0" smtClean="0"/>
-              <a:t>Code it! (sample2.html)</a:t>
+              <a:t>todoApp</a:t>
+            </a:r>
+            <a:r>
+              <a:rPr lang="en-US" dirty="0" smtClean="0"/>
+              <a:t>’)</a:t>
+            </a:r>
+            <a:r>
+              <a:rPr lang="en-US" dirty="0"/>
+              <a:t>.controller('</a:t>
+            </a:r>
+            <a:r>
+              <a:rPr lang="en-US" dirty="0" err="1"/>
+              <a:t>TodoController</a:t>
+            </a:r>
+            <a:r>
+              <a:rPr lang="en-US" dirty="0"/>
+              <a:t>', ['$scope', function ($scope) {</a:t>
+            </a:r>
+          </a:p>
+          <a:p>
+            <a:r>
+              <a:rPr lang="en-US" dirty="0"/>
+              <a:t>        </a:t>
+            </a:r>
+            <a:r>
+              <a:rPr lang="en-US" dirty="0" err="1"/>
+              <a:t>getInput</a:t>
+            </a:r>
+            <a:r>
+              <a:rPr lang="en-US" dirty="0"/>
+              <a:t> ({</a:t>
+            </a:r>
+            <a:r>
+              <a:rPr lang="en-US" dirty="0" err="1"/>
+              <a:t>name:"Rich</a:t>
+            </a:r>
+            <a:r>
+              <a:rPr lang="en-US" dirty="0"/>
+              <a:t>", </a:t>
+            </a:r>
+            <a:r>
+              <a:rPr lang="en-US" dirty="0" err="1"/>
+              <a:t>speciality</a:t>
+            </a:r>
+            <a:r>
+              <a:rPr lang="en-US" dirty="0"/>
+              <a:t>:"JavaScript"}, </a:t>
+            </a:r>
+            <a:r>
+              <a:rPr lang="en-US" dirty="0" err="1"/>
+              <a:t>logStuff</a:t>
+            </a:r>
+            <a:r>
+              <a:rPr lang="en-US" dirty="0"/>
+              <a:t>);</a:t>
+            </a:r>
+          </a:p>
+          <a:p>
+            <a:r>
+              <a:rPr lang="en-US" dirty="0"/>
+              <a:t>}]);</a:t>
             </a:r>
           </a:p>
         </p:txBody>
@@ -5497,7 +6460,7 @@
     </p:spTree>
     <p:extLst>
       <p:ext uri="{BB962C8B-B14F-4D97-AF65-F5344CB8AC3E}">
-        <p14:creationId xmlns:p14="http://schemas.microsoft.com/office/powerpoint/2010/main" val="2835322995"/>
+        <p14:creationId xmlns:p14="http://schemas.microsoft.com/office/powerpoint/2010/main" val="502696222"/>
       </p:ext>
     </p:extLst>
   </p:cSld>

</xml_diff>

<commit_message>
added keynote presentation file
</commit_message>
<xml_diff>
--- a/angular presentation.pptx
+++ b/angular presentation.pptx
@@ -211,7 +211,7 @@
           <a:p>
             <a:fld id="{38155B89-8BA9-4A47-884D-CA827C23995D}" type="datetimeFigureOut">
               <a:rPr lang="en-US" smtClean="0"/>
-              <a:t>11/20/14</a:t>
+              <a:t>11/21/14</a:t>
             </a:fld>
             <a:endParaRPr lang="en-US"/>
           </a:p>
@@ -751,7 +751,7 @@
             <a:fld id="{2FE7D661-1836-44F7-8FAF-35E8F866ECD3}" type="datetime1">
               <a:rPr lang="en-US" smtClean="0"/>
               <a:pPr/>
-              <a:t>11/20/14</a:t>
+              <a:t>11/21/14</a:t>
             </a:fld>
             <a:endParaRPr lang="en-US"/>
           </a:p>
@@ -917,7 +917,7 @@
           <a:p>
             <a:fld id="{B1FF71CE-B899-4B2B-848D-9F12F0C901B6}" type="datetimeFigureOut">
               <a:rPr lang="en-US" smtClean="0"/>
-              <a:t>11/20/14</a:t>
+              <a:t>11/21/14</a:t>
             </a:fld>
             <a:endParaRPr lang="en-US"/>
           </a:p>
@@ -1093,7 +1093,7 @@
             <a:fld id="{102CF1CA-F464-4B29-B867-EAF8A9B936E3}" type="datetime1">
               <a:rPr lang="en-US" smtClean="0"/>
               <a:pPr/>
-              <a:t>11/20/14</a:t>
+              <a:t>11/21/14</a:t>
             </a:fld>
             <a:endParaRPr lang="en-US" dirty="0"/>
           </a:p>
@@ -1260,7 +1260,7 @@
             <a:fld id="{CAE6B357-51B9-47D2-A71D-0D06CB03185D}" type="datetime1">
               <a:rPr lang="en-US" smtClean="0"/>
               <a:pPr/>
-              <a:t>11/20/14</a:t>
+              <a:t>11/21/14</a:t>
             </a:fld>
             <a:endParaRPr lang="en-US"/>
           </a:p>
@@ -1501,7 +1501,7 @@
             <a:fld id="{058CB827-F132-4DF6-9FB9-4035A4C798EF}" type="datetime1">
               <a:rPr lang="en-US" smtClean="0"/>
               <a:pPr/>
-              <a:t>11/20/14</a:t>
+              <a:t>11/21/14</a:t>
             </a:fld>
             <a:endParaRPr lang="en-US"/>
           </a:p>
@@ -1593,7 +1593,7 @@
             <a:fld id="{1A92A601-7D32-4ED7-AD1A-974B6DDBDCDC}" type="datetime1">
               <a:rPr lang="en-US" smtClean="0"/>
               <a:pPr/>
-              <a:t>11/20/14</a:t>
+              <a:t>11/21/14</a:t>
             </a:fld>
             <a:endParaRPr lang="en-US"/>
           </a:p>
@@ -1969,7 +1969,7 @@
             <a:fld id="{63A17B41-4A0C-4639-A132-E5C8F99A4BE8}" type="datetime1">
               <a:rPr lang="en-US" smtClean="0"/>
               <a:pPr/>
-              <a:t>11/20/14</a:t>
+              <a:t>11/21/14</a:t>
             </a:fld>
             <a:endParaRPr lang="en-US"/>
           </a:p>
@@ -2226,7 +2226,7 @@
             <a:fld id="{BE9967FD-6084-4075-993E-77EC8038773F}" type="datetime1">
               <a:rPr lang="en-US" smtClean="0"/>
               <a:pPr/>
-              <a:t>11/20/14</a:t>
+              <a:t>11/21/14</a:t>
             </a:fld>
             <a:endParaRPr lang="en-US"/>
           </a:p>
@@ -2318,7 +2318,7 @@
             <a:fld id="{3B988B47-74BA-4873-ADAE-EB0120124E83}" type="datetime1">
               <a:rPr lang="en-US" smtClean="0"/>
               <a:pPr/>
-              <a:t>11/20/14</a:t>
+              <a:t>11/21/14</a:t>
             </a:fld>
             <a:endParaRPr lang="en-US"/>
           </a:p>
@@ -2594,7 +2594,7 @@
             <a:fld id="{93CF52C1-9A39-494C-9977-BBEFAB872C1F}" type="datetime1">
               <a:rPr lang="en-US" smtClean="0"/>
               <a:pPr/>
-              <a:t>11/20/14</a:t>
+              <a:t>11/21/14</a:t>
             </a:fld>
             <a:endParaRPr lang="en-US"/>
           </a:p>
@@ -2868,7 +2868,7 @@
             <a:fld id="{CD1EACE2-EA00-4376-9A66-47ABB8B02CF5}" type="datetime1">
               <a:rPr lang="en-US" smtClean="0"/>
               <a:pPr/>
-              <a:t>11/20/14</a:t>
+              <a:t>11/21/14</a:t>
             </a:fld>
             <a:endParaRPr lang="en-US"/>
           </a:p>
@@ -3170,7 +3170,7 @@
             <a:fld id="{DA47DADC-55EA-4839-91C8-5BCC0EC06F5C}" type="datetime1">
               <a:rPr lang="en-US" smtClean="0"/>
               <a:pPr/>
-              <a:t>11/20/14</a:t>
+              <a:t>11/21/14</a:t>
             </a:fld>
             <a:endParaRPr lang="en-US" dirty="0"/>
           </a:p>
@@ -4457,22 +4457,12 @@
               <a:rPr lang="en-US" dirty="0" smtClean="0"/>
               <a:t>and inject it as a dependency </a:t>
             </a:r>
-            <a:endParaRPr lang="en-US" dirty="0" smtClean="0"/>
-          </a:p>
-          <a:p>
-            <a:r>
-              <a:rPr lang="en-US" dirty="0" smtClean="0"/>
-              <a:t>Also</a:t>
-            </a:r>
-            <a:r>
-              <a:rPr lang="en-US" dirty="0" smtClean="0"/>
-              <a:t>, routes require a web server to serve files (CORS</a:t>
-            </a:r>
-            <a:r>
-              <a:rPr lang="en-US" dirty="0" smtClean="0"/>
-              <a:t>), don’t try to run locally</a:t>
-            </a:r>
-            <a:endParaRPr lang="en-US" dirty="0" smtClean="0"/>
+          </a:p>
+          <a:p>
+            <a:r>
+              <a:rPr lang="en-US" dirty="0" smtClean="0"/>
+              <a:t>Also, routes require a web server to serve files (CORS), don’t try to run locally</a:t>
+            </a:r>
           </a:p>
           <a:p>
             <a:endParaRPr lang="en-US" dirty="0" smtClean="0"/>
@@ -5119,7 +5109,62 @@
           <a:bodyPr/>
           <a:lstStyle/>
           <a:p>
-            <a:pPr lvl="1"/>
+            <a:r>
+              <a:rPr lang="en-US" dirty="0"/>
+              <a:t>why unit test JavaScript?</a:t>
+            </a:r>
+          </a:p>
+          <a:p>
+            <a:r>
+              <a:rPr lang="en-US" dirty="0"/>
+              <a:t>developers are not perfect</a:t>
+            </a:r>
+          </a:p>
+          <a:p>
+            <a:r>
+              <a:rPr lang="en-US" dirty="0"/>
+              <a:t>what can automated testing do for you?</a:t>
+            </a:r>
+          </a:p>
+          <a:p>
+            <a:r>
+              <a:rPr lang="ro-RO" dirty="0"/>
+              <a:t>time, focus</a:t>
+            </a:r>
+          </a:p>
+          <a:p>
+            <a:r>
+              <a:rPr lang="en-US" dirty="0"/>
+              <a:t>purposes of different varieties of testing</a:t>
+            </a:r>
+          </a:p>
+          <a:p>
+            <a:r>
+              <a:rPr lang="en-US" dirty="0"/>
+              <a:t>unit</a:t>
+            </a:r>
+          </a:p>
+          <a:p>
+            <a:r>
+              <a:rPr lang="en-US" dirty="0"/>
+              <a:t>integration</a:t>
+            </a:r>
+          </a:p>
+          <a:p>
+            <a:r>
+              <a:rPr lang="en-US" dirty="0"/>
+              <a:t>why </a:t>
+            </a:r>
+            <a:r>
+              <a:rPr lang="en-US" dirty="0" smtClean="0"/>
+              <a:t>Karma, Jasmine, Protractor?</a:t>
+            </a:r>
+          </a:p>
+          <a:p>
+            <a:r>
+              <a:rPr lang="en-US" dirty="0" smtClean="0"/>
+              <a:t>Examples</a:t>
+            </a:r>
             <a:endParaRPr lang="en-US" dirty="0"/>
           </a:p>
         </p:txBody>
@@ -5294,7 +5339,9 @@
         </p:nvSpPr>
         <p:spPr/>
         <p:txBody>
-          <a:bodyPr/>
+          <a:bodyPr>
+            <a:normAutofit/>
+          </a:bodyPr>
           <a:lstStyle/>
           <a:p>
             <a:r>
@@ -5374,18 +5421,67 @@
               </a:rPr>
               <a:t>/</a:t>
             </a:r>
-            <a:endParaRPr lang="hu-HU" dirty="0" smtClean="0"/>
-          </a:p>
-          <a:p>
-            <a:r>
-              <a:rPr lang="en-US" dirty="0">
+            <a:endParaRPr lang="pl-PL" dirty="0" smtClean="0"/>
+          </a:p>
+          <a:p>
+            <a:r>
+              <a:rPr lang="pl-PL" dirty="0">
                 <a:hlinkClick r:id="rId7"/>
               </a:rPr>
+              <a:t>http://jasmine.github.io</a:t>
+            </a:r>
+            <a:r>
+              <a:rPr lang="pl-PL" dirty="0" smtClean="0">
+                <a:hlinkClick r:id="rId7"/>
+              </a:rPr>
+              <a:t>/</a:t>
+            </a:r>
+            <a:endParaRPr lang="pl-PL" dirty="0" smtClean="0"/>
+          </a:p>
+          <a:p>
+            <a:r>
+              <a:rPr lang="en-US" dirty="0">
+                <a:hlinkClick r:id="rId8"/>
+              </a:rPr>
+              <a:t>http://angular.github.io/protractor/#</a:t>
+            </a:r>
+            <a:r>
+              <a:rPr lang="en-US" dirty="0" smtClean="0">
+                <a:hlinkClick r:id="rId8"/>
+              </a:rPr>
+              <a:t>/</a:t>
+            </a:r>
+            <a:endParaRPr lang="pl-PL" dirty="0"/>
+          </a:p>
+          <a:p>
+            <a:r>
+              <a:rPr lang="nb-NO" dirty="0"/>
+              <a:t>http://karma-</a:t>
+            </a:r>
+            <a:r>
+              <a:rPr lang="nb-NO" dirty="0" err="1"/>
+              <a:t>runner.github.io</a:t>
+            </a:r>
+            <a:r>
+              <a:rPr lang="nb-NO" dirty="0"/>
+              <a:t>/0.12/</a:t>
+            </a:r>
+            <a:r>
+              <a:rPr lang="nb-NO"/>
+              <a:t>index.html</a:t>
+            </a:r>
+            <a:endParaRPr lang="hu-HU" dirty="0" smtClean="0"/>
+          </a:p>
+          <a:p>
+            <a:r>
+              <a:rPr lang="en-US" dirty="0">
+                <a:hlinkClick r:id="rId9"/>
+              </a:rPr>
               <a:t>http://stackoverflow.com/questions/tagged/</a:t>
             </a:r>
             <a:r>
               <a:rPr lang="en-US" dirty="0" smtClean="0">
-                <a:hlinkClick r:id="rId7"/>
+                <a:hlinkClick r:id="rId9"/>
               </a:rPr>
               <a:t>angularjs</a:t>
             </a:r>
@@ -5639,11 +5735,7 @@
             <a:pPr lvl="2"/>
             <a:r>
               <a:rPr lang="en-US" sz="2000" dirty="0" smtClean="0"/>
-              <a:t>Single page </a:t>
-            </a:r>
-            <a:r>
-              <a:rPr lang="en-US" sz="2000" dirty="0" smtClean="0"/>
-              <a:t>applications</a:t>
+              <a:t>Single page applications</a:t>
             </a:r>
           </a:p>
           <a:p>
@@ -5765,11 +5857,7 @@
           <a:p>
             <a:r>
               <a:rPr lang="en-US" dirty="0" smtClean="0"/>
-              <a:t>Angular modules to the </a:t>
-            </a:r>
-            <a:r>
-              <a:rPr lang="en-US" dirty="0" smtClean="0"/>
-              <a:t>rescue</a:t>
+              <a:t>Angular modules to the rescue</a:t>
             </a:r>
           </a:p>
           <a:p>
@@ -5777,7 +5865,6 @@
               <a:rPr lang="en-US" dirty="0" smtClean="0"/>
               <a:t>Only use SPA when it makes sense</a:t>
             </a:r>
-            <a:endParaRPr lang="en-US" dirty="0" smtClean="0"/>
           </a:p>
           <a:p>
             <a:endParaRPr lang="en-US" dirty="0"/>

</xml_diff>